<commit_message>
Update 3 - Model selection/Model selection.pptx
</commit_message>
<xml_diff>
--- a/3 - Model selection/Model selection.pptx
+++ b/3 - Model selection/Model selection.pptx
@@ -5,21 +5,31 @@
     <p:sldMasterId id="2147483690" r:id="rId1"/>
   </p:sldMasterIdLst>
   <p:notesMasterIdLst>
-    <p:notesMasterId r:id="rId14"/>
+    <p:notesMasterId r:id="rId24"/>
   </p:notesMasterIdLst>
   <p:sldIdLst>
     <p:sldId id="256" r:id="rId2"/>
     <p:sldId id="257" r:id="rId3"/>
     <p:sldId id="302" r:id="rId4"/>
     <p:sldId id="300" r:id="rId5"/>
-    <p:sldId id="301" r:id="rId6"/>
-    <p:sldId id="303" r:id="rId7"/>
-    <p:sldId id="304" r:id="rId8"/>
-    <p:sldId id="308" r:id="rId9"/>
-    <p:sldId id="306" r:id="rId10"/>
-    <p:sldId id="307" r:id="rId11"/>
-    <p:sldId id="309" r:id="rId12"/>
-    <p:sldId id="310" r:id="rId13"/>
+    <p:sldId id="313" r:id="rId6"/>
+    <p:sldId id="306" r:id="rId7"/>
+    <p:sldId id="303" r:id="rId8"/>
+    <p:sldId id="305" r:id="rId9"/>
+    <p:sldId id="307" r:id="rId10"/>
+    <p:sldId id="304" r:id="rId11"/>
+    <p:sldId id="311" r:id="rId12"/>
+    <p:sldId id="312" r:id="rId13"/>
+    <p:sldId id="318" r:id="rId14"/>
+    <p:sldId id="310" r:id="rId15"/>
+    <p:sldId id="319" r:id="rId16"/>
+    <p:sldId id="314" r:id="rId17"/>
+    <p:sldId id="308" r:id="rId18"/>
+    <p:sldId id="315" r:id="rId19"/>
+    <p:sldId id="316" r:id="rId20"/>
+    <p:sldId id="317" r:id="rId21"/>
+    <p:sldId id="321" r:id="rId22"/>
+    <p:sldId id="320" r:id="rId23"/>
   </p:sldIdLst>
   <p:sldSz cx="12192000" cy="6858000"/>
   <p:notesSz cx="6858000" cy="9144000"/>
@@ -4401,7 +4411,7 @@
           <p:cNvPr id="2" name="Title 1">
             <a:extLst>
               <a:ext uri="{FF2B5EF4-FFF2-40B4-BE49-F238E27FC236}">
-                <a16:creationId xmlns:a16="http://schemas.microsoft.com/office/drawing/2014/main" id="{5E1DB7E8-1DB3-4810-943E-A45658D607BD}"/>
+                <a16:creationId xmlns:a16="http://schemas.microsoft.com/office/drawing/2014/main" id="{29302498-EE59-41C9-81C0-4054DB4D0CAA}"/>
               </a:ext>
             </a:extLst>
           </p:cNvPr>
@@ -4418,12 +4428,8 @@
           <a:lstStyle/>
           <a:p>
             <a:r>
-              <a:rPr lang="en-US" dirty="0" err="1"/>
-              <a:t>Scikit</a:t>
-            </a:r>
-            <a:r>
               <a:rPr lang="en-US" dirty="0"/>
-              <a:t>-learn</a:t>
+              <a:t>Evaluating model performance</a:t>
             </a:r>
           </a:p>
         </p:txBody>
@@ -4433,7 +4439,7 @@
           <p:cNvPr id="3" name="Content Placeholder 2">
             <a:extLst>
               <a:ext uri="{FF2B5EF4-FFF2-40B4-BE49-F238E27FC236}">
-                <a16:creationId xmlns:a16="http://schemas.microsoft.com/office/drawing/2014/main" id="{CED8A043-6D73-4F61-9BA2-F3E6BEF0BD24}"/>
+                <a16:creationId xmlns:a16="http://schemas.microsoft.com/office/drawing/2014/main" id="{82165874-C108-46D0-8831-ACB3E3AFCDBD}"/>
               </a:ext>
             </a:extLst>
           </p:cNvPr>
@@ -4451,81 +4457,234 @@
           <a:p>
             <a:r>
               <a:rPr lang="en-US" dirty="0"/>
-              <a:t>Python package for machine learning</a:t>
-            </a:r>
-          </a:p>
-          <a:p>
+              <a:t>Measuring the “distance” between model output and desired output</a:t>
+            </a:r>
+          </a:p>
+          <a:p>
+            <a:pPr lvl="1"/>
             <a:r>
               <a:rPr lang="en-US" dirty="0"/>
-              <a:t>Mature documentation and lots of help online</a:t>
-            </a:r>
-            <a:endParaRPr lang="en-US" dirty="0">
-              <a:hlinkClick r:id="rId2"/>
-            </a:endParaRPr>
-          </a:p>
-          <a:p>
-            <a:r>
-              <a:rPr lang="en-US" dirty="0">
-                <a:hlinkClick r:id="rId2"/>
-              </a:rPr>
-              <a:t>http://scikit-learn.org/stable/</a:t>
-            </a:r>
-            <a:endParaRPr lang="en-US" dirty="0"/>
-          </a:p>
-          <a:p>
-            <a:r>
-              <a:rPr lang="en-US" dirty="0">
-                <a:hlinkClick r:id="rId3"/>
-              </a:rPr>
-              <a:t>Linear regression </a:t>
-            </a:r>
-            <a:r>
-              <a:rPr lang="en-US" dirty="0" err="1">
-                <a:hlinkClick r:id="rId3"/>
-              </a:rPr>
-              <a:t>Colab</a:t>
-            </a:r>
-            <a:r>
-              <a:rPr lang="en-US" dirty="0">
-                <a:hlinkClick r:id="rId3"/>
-              </a:rPr>
-              <a:t> example</a:t>
-            </a:r>
-            <a:endParaRPr lang="en-US" dirty="0"/>
-          </a:p>
-          <a:p>
-            <a:r>
-              <a:rPr lang="en-US" dirty="0">
-                <a:hlinkClick r:id="rId4"/>
-              </a:rPr>
-              <a:t>Classification </a:t>
-            </a:r>
-            <a:r>
-              <a:rPr lang="en-US" dirty="0" err="1">
-                <a:hlinkClick r:id="rId4"/>
-              </a:rPr>
-              <a:t>Colab</a:t>
-            </a:r>
-            <a:r>
-              <a:rPr lang="en-US" dirty="0">
-                <a:hlinkClick r:id="rId4"/>
-              </a:rPr>
-              <a:t> example</a:t>
-            </a:r>
-            <a:endParaRPr lang="en-US" dirty="0"/>
+              <a:t>L2-norm</a:t>
+            </a:r>
+          </a:p>
+          <a:p>
+            <a:pPr lvl="1"/>
+            <a:r>
+              <a:rPr lang="en-US" dirty="0"/>
+              <a:t>L1-norm </a:t>
+            </a:r>
+          </a:p>
+          <a:p>
+            <a:r>
+              <a:rPr lang="en-US" dirty="0"/>
+              <a:t>Loss function (AKA cost function, objective function, criterion)</a:t>
+            </a:r>
+          </a:p>
+          <a:p>
+            <a:pPr lvl="1"/>
+            <a:r>
+              <a:rPr lang="en-US" dirty="0"/>
+              <a:t>Mean Squared Error (used for regression</a:t>
+            </a:r>
+          </a:p>
+          <a:p>
+            <a:pPr lvl="1"/>
+            <a:r>
+              <a:rPr lang="en-US" dirty="0"/>
+              <a:t>Mean Absolute Error (used for regression)</a:t>
+            </a:r>
+          </a:p>
+          <a:p>
+            <a:pPr lvl="1"/>
+            <a:r>
+              <a:rPr lang="en-US" dirty="0"/>
+              <a:t>Cross entropy (used for classification)</a:t>
+            </a:r>
           </a:p>
         </p:txBody>
       </p:sp>
     </p:spTree>
     <p:extLst>
       <p:ext uri="{BB962C8B-B14F-4D97-AF65-F5344CB8AC3E}">
-        <p14:creationId xmlns:p14="http://schemas.microsoft.com/office/powerpoint/2010/main" val="3384091521"/>
+        <p14:creationId xmlns:p14="http://schemas.microsoft.com/office/powerpoint/2010/main" val="3088145637"/>
       </p:ext>
     </p:extLst>
   </p:cSld>
   <p:clrMapOvr>
     <a:masterClrMapping/>
   </p:clrMapOvr>
+  <p:timing>
+    <p:tnLst>
+      <p:par>
+        <p:cTn id="1" dur="indefinite" restart="never" nodeType="tmRoot">
+          <p:childTnLst>
+            <p:seq concurrent="1" nextAc="seek">
+              <p:cTn id="2" dur="indefinite" nodeType="mainSeq">
+                <p:childTnLst>
+                  <p:par>
+                    <p:cTn id="3" fill="hold">
+                      <p:stCondLst>
+                        <p:cond delay="indefinite"/>
+                      </p:stCondLst>
+                      <p:childTnLst>
+                        <p:par>
+                          <p:cTn id="4" fill="hold">
+                            <p:stCondLst>
+                              <p:cond delay="0"/>
+                            </p:stCondLst>
+                            <p:childTnLst>
+                              <p:par>
+                                <p:cTn id="5" presetID="1" presetClass="entr" presetSubtype="0" fill="hold" nodeType="clickEffect">
+                                  <p:stCondLst>
+                                    <p:cond delay="0"/>
+                                  </p:stCondLst>
+                                  <p:childTnLst>
+                                    <p:set>
+                                      <p:cBhvr>
+                                        <p:cTn id="6" dur="1" fill="hold">
+                                          <p:stCondLst>
+                                            <p:cond delay="0"/>
+                                          </p:stCondLst>
+                                        </p:cTn>
+                                        <p:tgtEl>
+                                          <p:spTgt spid="3">
+                                            <p:txEl>
+                                              <p:pRg st="3" end="3"/>
+                                            </p:txEl>
+                                          </p:spTgt>
+                                        </p:tgtEl>
+                                        <p:attrNameLst>
+                                          <p:attrName>style.visibility</p:attrName>
+                                        </p:attrNameLst>
+                                      </p:cBhvr>
+                                      <p:to>
+                                        <p:strVal val="visible"/>
+                                      </p:to>
+                                    </p:set>
+                                  </p:childTnLst>
+                                </p:cTn>
+                              </p:par>
+                              <p:par>
+                                <p:cTn id="7" presetID="1" presetClass="entr" presetSubtype="0" fill="hold" nodeType="withEffect">
+                                  <p:stCondLst>
+                                    <p:cond delay="0"/>
+                                  </p:stCondLst>
+                                  <p:childTnLst>
+                                    <p:set>
+                                      <p:cBhvr>
+                                        <p:cTn id="8" dur="1" fill="hold">
+                                          <p:stCondLst>
+                                            <p:cond delay="0"/>
+                                          </p:stCondLst>
+                                        </p:cTn>
+                                        <p:tgtEl>
+                                          <p:spTgt spid="3">
+                                            <p:txEl>
+                                              <p:pRg st="4" end="4"/>
+                                            </p:txEl>
+                                          </p:spTgt>
+                                        </p:tgtEl>
+                                        <p:attrNameLst>
+                                          <p:attrName>style.visibility</p:attrName>
+                                        </p:attrNameLst>
+                                      </p:cBhvr>
+                                      <p:to>
+                                        <p:strVal val="visible"/>
+                                      </p:to>
+                                    </p:set>
+                                  </p:childTnLst>
+                                </p:cTn>
+                              </p:par>
+                              <p:par>
+                                <p:cTn id="9" presetID="1" presetClass="entr" presetSubtype="0" fill="hold" nodeType="withEffect">
+                                  <p:stCondLst>
+                                    <p:cond delay="0"/>
+                                  </p:stCondLst>
+                                  <p:childTnLst>
+                                    <p:set>
+                                      <p:cBhvr>
+                                        <p:cTn id="10" dur="1" fill="hold">
+                                          <p:stCondLst>
+                                            <p:cond delay="0"/>
+                                          </p:stCondLst>
+                                        </p:cTn>
+                                        <p:tgtEl>
+                                          <p:spTgt spid="3">
+                                            <p:txEl>
+                                              <p:pRg st="5" end="5"/>
+                                            </p:txEl>
+                                          </p:spTgt>
+                                        </p:tgtEl>
+                                        <p:attrNameLst>
+                                          <p:attrName>style.visibility</p:attrName>
+                                        </p:attrNameLst>
+                                      </p:cBhvr>
+                                      <p:to>
+                                        <p:strVal val="visible"/>
+                                      </p:to>
+                                    </p:set>
+                                  </p:childTnLst>
+                                </p:cTn>
+                              </p:par>
+                              <p:par>
+                                <p:cTn id="11" presetID="1" presetClass="entr" presetSubtype="0" fill="hold" nodeType="withEffect">
+                                  <p:stCondLst>
+                                    <p:cond delay="0"/>
+                                  </p:stCondLst>
+                                  <p:childTnLst>
+                                    <p:set>
+                                      <p:cBhvr>
+                                        <p:cTn id="12" dur="1" fill="hold">
+                                          <p:stCondLst>
+                                            <p:cond delay="0"/>
+                                          </p:stCondLst>
+                                        </p:cTn>
+                                        <p:tgtEl>
+                                          <p:spTgt spid="3">
+                                            <p:txEl>
+                                              <p:pRg st="6" end="6"/>
+                                            </p:txEl>
+                                          </p:spTgt>
+                                        </p:tgtEl>
+                                        <p:attrNameLst>
+                                          <p:attrName>style.visibility</p:attrName>
+                                        </p:attrNameLst>
+                                      </p:cBhvr>
+                                      <p:to>
+                                        <p:strVal val="visible"/>
+                                      </p:to>
+                                    </p:set>
+                                  </p:childTnLst>
+                                </p:cTn>
+                              </p:par>
+                            </p:childTnLst>
+                          </p:cTn>
+                        </p:par>
+                      </p:childTnLst>
+                    </p:cTn>
+                  </p:par>
+                </p:childTnLst>
+              </p:cTn>
+              <p:prevCondLst>
+                <p:cond evt="onPrev" delay="0">
+                  <p:tgtEl>
+                    <p:sldTgt/>
+                  </p:tgtEl>
+                </p:cond>
+              </p:prevCondLst>
+              <p:nextCondLst>
+                <p:cond evt="onNext" delay="0">
+                  <p:tgtEl>
+                    <p:sldTgt/>
+                  </p:tgtEl>
+                </p:cond>
+              </p:nextCondLst>
+            </p:seq>
+          </p:childTnLst>
+        </p:cTn>
+      </p:par>
+    </p:tnLst>
+  </p:timing>
 </p:sld>
 </file>
 
@@ -4551,7 +4710,7 @@
           <p:cNvPr id="2" name="Title 1">
             <a:extLst>
               <a:ext uri="{FF2B5EF4-FFF2-40B4-BE49-F238E27FC236}">
-                <a16:creationId xmlns:a16="http://schemas.microsoft.com/office/drawing/2014/main" id="{EA68E3B9-9885-4589-A63C-4692F915B754}"/>
+                <a16:creationId xmlns:a16="http://schemas.microsoft.com/office/drawing/2014/main" id="{A65E8030-7788-4420-9540-4E1609320200}"/>
               </a:ext>
             </a:extLst>
           </p:cNvPr>
@@ -4564,14 +4723,12 @@
         </p:nvSpPr>
         <p:spPr/>
         <p:txBody>
-          <a:bodyPr>
-            <a:normAutofit/>
-          </a:bodyPr>
+          <a:bodyPr/>
           <a:lstStyle/>
           <a:p>
             <a:r>
               <a:rPr lang="en-US" dirty="0"/>
-              <a:t>Recent progress: modeling nature</a:t>
+              <a:t>Norm</a:t>
             </a:r>
           </a:p>
         </p:txBody>
@@ -4581,7 +4738,7 @@
           <p:cNvPr id="3" name="Content Placeholder 2">
             <a:extLst>
               <a:ext uri="{FF2B5EF4-FFF2-40B4-BE49-F238E27FC236}">
-                <a16:creationId xmlns:a16="http://schemas.microsoft.com/office/drawing/2014/main" id="{14F507C2-67EC-46AD-96D5-553516E7AA3E}"/>
+                <a16:creationId xmlns:a16="http://schemas.microsoft.com/office/drawing/2014/main" id="{C7771074-B19F-4FA5-BADE-7207ED4AAB70}"/>
               </a:ext>
             </a:extLst>
           </p:cNvPr>
@@ -4598,40 +4755,28 @@
           <a:lstStyle/>
           <a:p>
             <a:r>
-              <a:rPr lang="en-US" dirty="0">
-                <a:hlinkClick r:id="rId2"/>
-              </a:rPr>
-              <a:t>Deep learning models reveal internal structure and diverse computations in the retina under natural scenes</a:t>
-            </a:r>
-            <a:endParaRPr lang="en-US" dirty="0"/>
-          </a:p>
-          <a:p>
-            <a:r>
               <a:rPr lang="en-US" dirty="0"/>
-              <a:t>Inputs: natural scene images (video)</a:t>
+              <a:t>From linear algebra</a:t>
             </a:r>
           </a:p>
           <a:p>
             <a:r>
               <a:rPr lang="en-US" dirty="0"/>
-              <a:t>Training labels: measurements from ganglion cells</a:t>
+              <a:t>Norm – function that assigns a positive “length” to a vector</a:t>
             </a:r>
           </a:p>
           <a:p>
             <a:r>
               <a:rPr lang="en-US" dirty="0"/>
-              <a:t>Test: compared model outputs to a separate retinae that the model was never fit to</a:t>
-            </a:r>
-          </a:p>
-          <a:p>
-            <a:endParaRPr lang="en-US" dirty="0"/>
+              <a:t>Most familiar is the Euclidean norm </a:t>
+            </a:r>
           </a:p>
         </p:txBody>
       </p:sp>
     </p:spTree>
     <p:extLst>
       <p:ext uri="{BB962C8B-B14F-4D97-AF65-F5344CB8AC3E}">
-        <p14:creationId xmlns:p14="http://schemas.microsoft.com/office/powerpoint/2010/main" val="1414708750"/>
+        <p14:creationId xmlns:p14="http://schemas.microsoft.com/office/powerpoint/2010/main" val="407417380"/>
       </p:ext>
     </p:extLst>
   </p:cSld>
@@ -4663,7 +4808,7 @@
           <p:cNvPr id="2" name="Title 1">
             <a:extLst>
               <a:ext uri="{FF2B5EF4-FFF2-40B4-BE49-F238E27FC236}">
-                <a16:creationId xmlns:a16="http://schemas.microsoft.com/office/drawing/2014/main" id="{171ECD03-1C8B-46F7-81E0-D7E49A86CD58}"/>
+                <a16:creationId xmlns:a16="http://schemas.microsoft.com/office/drawing/2014/main" id="{AC20E1A0-402B-4EA5-A518-3535C7B7B895}"/>
               </a:ext>
             </a:extLst>
           </p:cNvPr>
@@ -4679,69 +4824,1808 @@
           <a:bodyPr/>
           <a:lstStyle/>
           <a:p>
-            <a:endParaRPr lang="en-US"/>
-          </a:p>
-        </p:txBody>
-      </p:sp>
-      <p:sp>
-        <p:nvSpPr>
-          <p:cNvPr id="3" name="Content Placeholder 2">
-            <a:extLst>
-              <a:ext uri="{FF2B5EF4-FFF2-40B4-BE49-F238E27FC236}">
-                <a16:creationId xmlns:a16="http://schemas.microsoft.com/office/drawing/2014/main" id="{848A8542-40A0-43B9-99A6-A92B46AEADDE}"/>
-              </a:ext>
-            </a:extLst>
-          </p:cNvPr>
-          <p:cNvSpPr>
-            <a:spLocks noGrp="1"/>
-          </p:cNvSpPr>
-          <p:nvPr>
-            <p:ph idx="1"/>
-          </p:nvPr>
-        </p:nvSpPr>
-        <p:spPr/>
-        <p:txBody>
-          <a:bodyPr/>
-          <a:lstStyle/>
-          <a:p>
-            <a:endParaRPr lang="en-US"/>
-          </a:p>
-        </p:txBody>
-      </p:sp>
-      <p:pic>
-        <p:nvPicPr>
-          <p:cNvPr id="4" name="Picture 3">
-            <a:extLst>
-              <a:ext uri="{FF2B5EF4-FFF2-40B4-BE49-F238E27FC236}">
-                <a16:creationId xmlns:a16="http://schemas.microsoft.com/office/drawing/2014/main" id="{0117074A-B44A-47D4-B805-5E4E067187FB}"/>
-              </a:ext>
-            </a:extLst>
-          </p:cNvPr>
-          <p:cNvPicPr>
-            <a:picLocks noChangeAspect="1"/>
-          </p:cNvPicPr>
-          <p:nvPr/>
-        </p:nvPicPr>
-        <p:blipFill>
-          <a:blip r:embed="rId2"/>
-          <a:stretch>
-            <a:fillRect/>
-          </a:stretch>
-        </p:blipFill>
-        <p:spPr>
-          <a:xfrm>
-            <a:off x="1709811" y="0"/>
-            <a:ext cx="8772377" cy="6858000"/>
-          </a:xfrm>
-          <a:prstGeom prst="rect">
-            <a:avLst/>
-          </a:prstGeom>
-        </p:spPr>
-      </p:pic>
+            <a:r>
+              <a:rPr lang="en-US" dirty="0"/>
+              <a:t>L2-norm (regression)</a:t>
+            </a:r>
+          </a:p>
+        </p:txBody>
+      </p:sp>
+      <mc:AlternateContent xmlns:mc="http://schemas.openxmlformats.org/markup-compatibility/2006">
+        <mc:Choice xmlns:a14="http://schemas.microsoft.com/office/drawing/2010/main" Requires="a14">
+          <p:sp>
+            <p:nvSpPr>
+              <p:cNvPr id="3" name="Content Placeholder 2">
+                <a:extLst>
+                  <a:ext uri="{FF2B5EF4-FFF2-40B4-BE49-F238E27FC236}">
+                    <a16:creationId xmlns:a16="http://schemas.microsoft.com/office/drawing/2014/main" id="{6E220975-935E-4F96-BBDC-2CB03E2861D1}"/>
+                  </a:ext>
+                </a:extLst>
+              </p:cNvPr>
+              <p:cNvSpPr>
+                <a:spLocks noGrp="1"/>
+              </p:cNvSpPr>
+              <p:nvPr>
+                <p:ph idx="1"/>
+              </p:nvPr>
+            </p:nvSpPr>
+            <p:spPr/>
+            <p:txBody>
+              <a:bodyPr/>
+              <a:lstStyle/>
+              <a:p>
+                <a14:m>
+                  <m:oMath xmlns:m="http://schemas.openxmlformats.org/officeDocument/2006/math">
+                    <m:sSub>
+                      <m:sSubPr>
+                        <m:ctrlPr>
+                          <a:rPr lang="en-US" b="0" i="1" smtClean="0">
+                            <a:latin typeface="Cambria Math" panose="02040503050406030204" pitchFamily="18" charset="0"/>
+                          </a:rPr>
+                        </m:ctrlPr>
+                      </m:sSubPr>
+                      <m:e>
+                        <m:d>
+                          <m:dPr>
+                            <m:begChr m:val="‖"/>
+                            <m:endChr m:val="‖"/>
+                            <m:ctrlPr>
+                              <a:rPr lang="en-US" b="0" i="1" smtClean="0">
+                                <a:latin typeface="Cambria Math" panose="02040503050406030204" pitchFamily="18" charset="0"/>
+                              </a:rPr>
+                            </m:ctrlPr>
+                          </m:dPr>
+                          <m:e>
+                            <m:r>
+                              <a:rPr lang="en-US" b="0" i="1" smtClean="0">
+                                <a:latin typeface="Cambria Math" panose="02040503050406030204" pitchFamily="18" charset="0"/>
+                              </a:rPr>
+                              <m:t>𝑥</m:t>
+                            </m:r>
+                          </m:e>
+                        </m:d>
+                      </m:e>
+                      <m:sub>
+                        <m:r>
+                          <a:rPr lang="en-US" b="0" i="1" smtClean="0">
+                            <a:latin typeface="Cambria Math" panose="02040503050406030204" pitchFamily="18" charset="0"/>
+                          </a:rPr>
+                          <m:t>2</m:t>
+                        </m:r>
+                      </m:sub>
+                    </m:sSub>
+                    <m:r>
+                      <a:rPr lang="en-US" b="0" i="0" smtClean="0">
+                        <a:latin typeface="Cambria Math" panose="02040503050406030204" pitchFamily="18" charset="0"/>
+                      </a:rPr>
+                      <m:t>=</m:t>
+                    </m:r>
+                    <m:rad>
+                      <m:radPr>
+                        <m:degHide m:val="on"/>
+                        <m:ctrlPr>
+                          <a:rPr lang="en-US" dirty="0" smtClean="0">
+                            <a:latin typeface="Cambria Math" panose="02040503050406030204" pitchFamily="18" charset="0"/>
+                          </a:rPr>
+                        </m:ctrlPr>
+                      </m:radPr>
+                      <m:deg/>
+                      <m:e>
+                        <m:sSub>
+                          <m:sSubPr>
+                            <m:ctrlPr>
+                              <a:rPr lang="en-US" dirty="0">
+                                <a:latin typeface="Cambria Math" panose="02040503050406030204" pitchFamily="18" charset="0"/>
+                              </a:rPr>
+                            </m:ctrlPr>
+                          </m:sSubPr>
+                          <m:e>
+                            <m:r>
+                              <a:rPr lang="en-US" i="1" dirty="0">
+                                <a:latin typeface="Cambria Math" panose="02040503050406030204" pitchFamily="18" charset="0"/>
+                              </a:rPr>
+                              <m:t>𝑥</m:t>
+                            </m:r>
+                          </m:e>
+                          <m:sub>
+                            <m:r>
+                              <a:rPr lang="en-US" i="0" dirty="0">
+                                <a:latin typeface="Cambria Math" panose="02040503050406030204" pitchFamily="18" charset="0"/>
+                              </a:rPr>
+                              <m:t>1</m:t>
+                            </m:r>
+                          </m:sub>
+                        </m:sSub>
+                        <m:r>
+                          <a:rPr lang="en-US" b="0" i="1" baseline="30000" dirty="0" smtClean="0">
+                            <a:latin typeface="Cambria Math" panose="02040503050406030204" pitchFamily="18" charset="0"/>
+                          </a:rPr>
+                          <m:t>2</m:t>
+                        </m:r>
+                        <m:r>
+                          <a:rPr lang="en-US" i="0" dirty="0">
+                            <a:latin typeface="Cambria Math" panose="02040503050406030204" pitchFamily="18" charset="0"/>
+                          </a:rPr>
+                          <m:t>+</m:t>
+                        </m:r>
+                        <m:sSub>
+                          <m:sSubPr>
+                            <m:ctrlPr>
+                              <a:rPr lang="en-US" i="1" dirty="0">
+                                <a:latin typeface="Cambria Math" panose="02040503050406030204" pitchFamily="18" charset="0"/>
+                              </a:rPr>
+                            </m:ctrlPr>
+                          </m:sSubPr>
+                          <m:e>
+                            <m:r>
+                              <a:rPr lang="en-US" i="1" dirty="0">
+                                <a:latin typeface="Cambria Math" panose="02040503050406030204" pitchFamily="18" charset="0"/>
+                              </a:rPr>
+                              <m:t>𝑥</m:t>
+                            </m:r>
+                          </m:e>
+                          <m:sub>
+                            <m:r>
+                              <a:rPr lang="en-US" i="0" dirty="0">
+                                <a:latin typeface="Cambria Math" panose="02040503050406030204" pitchFamily="18" charset="0"/>
+                              </a:rPr>
+                              <m:t>2</m:t>
+                            </m:r>
+                          </m:sub>
+                        </m:sSub>
+                        <m:r>
+                          <a:rPr lang="en-US" i="1" baseline="30000" dirty="0">
+                            <a:latin typeface="Cambria Math" panose="02040503050406030204" pitchFamily="18" charset="0"/>
+                          </a:rPr>
+                          <m:t>2</m:t>
+                        </m:r>
+                        <m:r>
+                          <a:rPr lang="en-US" i="0" dirty="0">
+                            <a:latin typeface="Cambria Math" panose="02040503050406030204" pitchFamily="18" charset="0"/>
+                          </a:rPr>
+                          <m:t>+</m:t>
+                        </m:r>
+                        <m:r>
+                          <a:rPr lang="en-US" dirty="0">
+                            <a:latin typeface="Cambria Math" panose="02040503050406030204" pitchFamily="18" charset="0"/>
+                          </a:rPr>
+                          <m:t>…</m:t>
+                        </m:r>
+                        <m:r>
+                          <a:rPr lang="en-US" b="0" i="1" dirty="0" smtClean="0">
+                            <a:latin typeface="Cambria Math" panose="02040503050406030204" pitchFamily="18" charset="0"/>
+                          </a:rPr>
+                          <m:t>+</m:t>
+                        </m:r>
+                        <m:sSub>
+                          <m:sSubPr>
+                            <m:ctrlPr>
+                              <a:rPr lang="en-US" i="1" dirty="0">
+                                <a:latin typeface="Cambria Math" panose="02040503050406030204" pitchFamily="18" charset="0"/>
+                              </a:rPr>
+                            </m:ctrlPr>
+                          </m:sSubPr>
+                          <m:e>
+                            <m:r>
+                              <a:rPr lang="en-US" i="1" dirty="0">
+                                <a:latin typeface="Cambria Math" panose="02040503050406030204" pitchFamily="18" charset="0"/>
+                              </a:rPr>
+                              <m:t>𝑥</m:t>
+                            </m:r>
+                          </m:e>
+                          <m:sub>
+                            <m:r>
+                              <a:rPr lang="en-US" i="1" dirty="0">
+                                <a:latin typeface="Cambria Math" panose="02040503050406030204" pitchFamily="18" charset="0"/>
+                              </a:rPr>
+                              <m:t>𝑛</m:t>
+                            </m:r>
+                          </m:sub>
+                        </m:sSub>
+                        <m:r>
+                          <a:rPr lang="en-US" i="1" baseline="30000" dirty="0">
+                            <a:latin typeface="Cambria Math" panose="02040503050406030204" pitchFamily="18" charset="0"/>
+                          </a:rPr>
+                          <m:t>2</m:t>
+                        </m:r>
+                      </m:e>
+                    </m:rad>
+                  </m:oMath>
+                </a14:m>
+                <a:endParaRPr lang="en-US" dirty="0"/>
+              </a:p>
+              <a:p>
+                <a:r>
+                  <a:rPr lang="en-US" dirty="0"/>
+                  <a:t>Euclidean norm in </a:t>
+                </a:r>
+                <a14:m>
+                  <m:oMath xmlns:m="http://schemas.openxmlformats.org/officeDocument/2006/math">
+                    <m:r>
+                      <a:rPr lang="en-US" dirty="0" smtClean="0">
+                        <a:latin typeface="Cambria Math" panose="02040503050406030204" pitchFamily="18" charset="0"/>
+                      </a:rPr>
+                      <m:t>ℝ</m:t>
+                    </m:r>
+                    <m:r>
+                      <m:rPr>
+                        <m:sty m:val="p"/>
+                      </m:rPr>
+                      <a:rPr lang="en-US" b="0" i="0" baseline="30000" dirty="0" smtClean="0">
+                        <a:latin typeface="Cambria Math" panose="02040503050406030204" pitchFamily="18" charset="0"/>
+                      </a:rPr>
+                      <m:t>n</m:t>
+                    </m:r>
+                  </m:oMath>
+                </a14:m>
+                <a:endParaRPr lang="en-US" dirty="0"/>
+              </a:p>
+              <a:p>
+                <a:endParaRPr lang="en-US" dirty="0"/>
+              </a:p>
+            </p:txBody>
+          </p:sp>
+        </mc:Choice>
+        <mc:Fallback>
+          <p:sp>
+            <p:nvSpPr>
+              <p:cNvPr id="3" name="Content Placeholder 2">
+                <a:extLst>
+                  <a:ext uri="{FF2B5EF4-FFF2-40B4-BE49-F238E27FC236}">
+                    <a16:creationId xmlns:a16="http://schemas.microsoft.com/office/drawing/2014/main" id="{6E220975-935E-4F96-BBDC-2CB03E2861D1}"/>
+                  </a:ext>
+                </a:extLst>
+              </p:cNvPr>
+              <p:cNvSpPr>
+                <a:spLocks noGrp="1" noRot="1" noChangeAspect="1" noMove="1" noResize="1" noEditPoints="1" noAdjustHandles="1" noChangeArrowheads="1" noChangeShapeType="1" noTextEdit="1"/>
+              </p:cNvSpPr>
+              <p:nvPr>
+                <p:ph idx="1"/>
+              </p:nvPr>
+            </p:nvSpPr>
+            <p:spPr>
+              <a:blipFill>
+                <a:blip r:embed="rId2"/>
+                <a:stretch>
+                  <a:fillRect l="-1043"/>
+                </a:stretch>
+              </a:blipFill>
+            </p:spPr>
+            <p:txBody>
+              <a:bodyPr/>
+              <a:lstStyle/>
+              <a:p>
+                <a:r>
+                  <a:rPr lang="en-US">
+                    <a:noFill/>
+                  </a:rPr>
+                  <a:t> </a:t>
+                </a:r>
+              </a:p>
+            </p:txBody>
+          </p:sp>
+        </mc:Fallback>
+      </mc:AlternateContent>
     </p:spTree>
     <p:extLst>
       <p:ext uri="{BB962C8B-B14F-4D97-AF65-F5344CB8AC3E}">
-        <p14:creationId xmlns:p14="http://schemas.microsoft.com/office/powerpoint/2010/main" val="1210074687"/>
+        <p14:creationId xmlns:p14="http://schemas.microsoft.com/office/powerpoint/2010/main" val="2824044418"/>
+      </p:ext>
+    </p:extLst>
+  </p:cSld>
+  <p:clrMapOvr>
+    <a:masterClrMapping/>
+  </p:clrMapOvr>
+</p:sld>
+</file>
+
+<file path=ppt/slides/slide13.xml><?xml version="1.0" encoding="utf-8"?>
+<p:sld xmlns:a="http://schemas.openxmlformats.org/drawingml/2006/main" xmlns:r="http://schemas.openxmlformats.org/officeDocument/2006/relationships" xmlns:p="http://schemas.openxmlformats.org/presentationml/2006/main">
+  <p:cSld>
+    <p:spTree>
+      <p:nvGrpSpPr>
+        <p:cNvPr id="1" name=""/>
+        <p:cNvGrpSpPr/>
+        <p:nvPr/>
+      </p:nvGrpSpPr>
+      <p:grpSpPr>
+        <a:xfrm>
+          <a:off x="0" y="0"/>
+          <a:ext cx="0" cy="0"/>
+          <a:chOff x="0" y="0"/>
+          <a:chExt cx="0" cy="0"/>
+        </a:xfrm>
+      </p:grpSpPr>
+      <p:sp>
+        <p:nvSpPr>
+          <p:cNvPr id="2" name="Title 1">
+            <a:extLst>
+              <a:ext uri="{FF2B5EF4-FFF2-40B4-BE49-F238E27FC236}">
+                <a16:creationId xmlns:a16="http://schemas.microsoft.com/office/drawing/2014/main" id="{693510FD-79C8-4AA1-B473-669BBDC3D556}"/>
+              </a:ext>
+            </a:extLst>
+          </p:cNvPr>
+          <p:cNvSpPr>
+            <a:spLocks noGrp="1"/>
+          </p:cNvSpPr>
+          <p:nvPr>
+            <p:ph type="title"/>
+          </p:nvPr>
+        </p:nvSpPr>
+        <p:spPr/>
+        <p:txBody>
+          <a:bodyPr/>
+          <a:lstStyle/>
+          <a:p>
+            <a:r>
+              <a:rPr lang="en-US" dirty="0"/>
+              <a:t>Mean Absolute Error (MAE)</a:t>
+            </a:r>
+          </a:p>
+        </p:txBody>
+      </p:sp>
+      <mc:AlternateContent xmlns:mc="http://schemas.openxmlformats.org/markup-compatibility/2006">
+        <mc:Choice xmlns:a14="http://schemas.microsoft.com/office/drawing/2010/main" Requires="a14">
+          <p:sp>
+            <p:nvSpPr>
+              <p:cNvPr id="3" name="Content Placeholder 2">
+                <a:extLst>
+                  <a:ext uri="{FF2B5EF4-FFF2-40B4-BE49-F238E27FC236}">
+                    <a16:creationId xmlns:a16="http://schemas.microsoft.com/office/drawing/2014/main" id="{712DF191-358B-4A00-8866-E00D1F4ADC87}"/>
+                  </a:ext>
+                </a:extLst>
+              </p:cNvPr>
+              <p:cNvSpPr>
+                <a:spLocks noGrp="1"/>
+              </p:cNvSpPr>
+              <p:nvPr>
+                <p:ph idx="1"/>
+              </p:nvPr>
+            </p:nvSpPr>
+            <p:spPr/>
+            <p:txBody>
+              <a:bodyPr/>
+              <a:lstStyle/>
+              <a:p>
+                <a:r>
+                  <a:rPr lang="en-US" dirty="0"/>
+                  <a:t>Related to L2-norm</a:t>
+                </a:r>
+              </a:p>
+              <a:p>
+                <a:r>
+                  <a:rPr lang="en-US" dirty="0"/>
+                  <a:t>The average difference between predictions and labels</a:t>
+                </a:r>
+              </a:p>
+              <a:p>
+                <a:r>
+                  <a:rPr lang="en-US" dirty="0"/>
+                  <a:t>MAE = </a:t>
+                </a:r>
+                <a14:m>
+                  <m:oMath xmlns:m="http://schemas.openxmlformats.org/officeDocument/2006/math">
+                    <m:f>
+                      <m:fPr>
+                        <m:ctrlPr>
+                          <a:rPr lang="en-US" dirty="0" smtClean="0">
+                            <a:latin typeface="Cambria Math" panose="02040503050406030204" pitchFamily="18" charset="0"/>
+                          </a:rPr>
+                        </m:ctrlPr>
+                      </m:fPr>
+                      <m:num>
+                        <m:r>
+                          <a:rPr lang="en-US" dirty="0">
+                            <a:latin typeface="Cambria Math" panose="02040503050406030204" pitchFamily="18" charset="0"/>
+                          </a:rPr>
+                          <m:t>1</m:t>
+                        </m:r>
+                      </m:num>
+                      <m:den>
+                        <m:r>
+                          <a:rPr lang="en-US" i="1" dirty="0">
+                            <a:latin typeface="Cambria Math" panose="02040503050406030204" pitchFamily="18" charset="0"/>
+                          </a:rPr>
+                          <m:t>𝑁</m:t>
+                        </m:r>
+                      </m:den>
+                    </m:f>
+                    <m:nary>
+                      <m:naryPr>
+                        <m:chr m:val="∑"/>
+                        <m:limLoc m:val="undOvr"/>
+                        <m:grow m:val="on"/>
+                        <m:ctrlPr>
+                          <a:rPr lang="en-US" i="1" dirty="0">
+                            <a:latin typeface="Cambria Math" panose="02040503050406030204" pitchFamily="18" charset="0"/>
+                          </a:rPr>
+                        </m:ctrlPr>
+                      </m:naryPr>
+                      <m:sub>
+                        <m:r>
+                          <a:rPr lang="en-US" i="1" dirty="0">
+                            <a:latin typeface="Cambria Math" panose="02040503050406030204" pitchFamily="18" charset="0"/>
+                          </a:rPr>
+                          <m:t>𝑖</m:t>
+                        </m:r>
+                        <m:r>
+                          <a:rPr lang="en-US" i="0" dirty="0">
+                            <a:latin typeface="Cambria Math" panose="02040503050406030204" pitchFamily="18" charset="0"/>
+                          </a:rPr>
+                          <m:t>=1</m:t>
+                        </m:r>
+                      </m:sub>
+                      <m:sup>
+                        <m:r>
+                          <a:rPr lang="en-US" i="1" dirty="0">
+                            <a:latin typeface="Cambria Math" panose="02040503050406030204" pitchFamily="18" charset="0"/>
+                          </a:rPr>
+                          <m:t>𝑁</m:t>
+                        </m:r>
+                      </m:sup>
+                      <m:e>
+                        <m:sSup>
+                          <m:sSupPr>
+                            <m:ctrlPr>
+                              <a:rPr lang="en-US" i="1" dirty="0">
+                                <a:latin typeface="Cambria Math" panose="02040503050406030204" pitchFamily="18" charset="0"/>
+                              </a:rPr>
+                            </m:ctrlPr>
+                          </m:sSupPr>
+                          <m:e>
+                            <m:d>
+                              <m:dPr>
+                                <m:ctrlPr>
+                                  <a:rPr lang="en-US" i="1" dirty="0">
+                                    <a:latin typeface="Cambria Math" panose="02040503050406030204" pitchFamily="18" charset="0"/>
+                                  </a:rPr>
+                                </m:ctrlPr>
+                              </m:dPr>
+                              <m:e>
+                                <m:sSub>
+                                  <m:sSubPr>
+                                    <m:ctrlPr>
+                                      <a:rPr lang="en-US" i="1" dirty="0">
+                                        <a:latin typeface="Cambria Math" panose="02040503050406030204" pitchFamily="18" charset="0"/>
+                                      </a:rPr>
+                                    </m:ctrlPr>
+                                  </m:sSubPr>
+                                  <m:e>
+                                    <m:acc>
+                                      <m:accPr>
+                                        <m:chr m:val="̂"/>
+                                        <m:ctrlPr>
+                                          <a:rPr lang="en-US" i="1" dirty="0">
+                                            <a:latin typeface="Cambria Math" panose="02040503050406030204" pitchFamily="18" charset="0"/>
+                                          </a:rPr>
+                                        </m:ctrlPr>
+                                      </m:accPr>
+                                      <m:e>
+                                        <m:r>
+                                          <a:rPr lang="en-US" i="1" dirty="0">
+                                            <a:latin typeface="Cambria Math" panose="02040503050406030204" pitchFamily="18" charset="0"/>
+                                          </a:rPr>
+                                          <m:t>𝑦</m:t>
+                                        </m:r>
+                                      </m:e>
+                                    </m:acc>
+                                  </m:e>
+                                  <m:sub>
+                                    <m:r>
+                                      <a:rPr lang="en-US" i="1" dirty="0">
+                                        <a:latin typeface="Cambria Math" panose="02040503050406030204" pitchFamily="18" charset="0"/>
+                                      </a:rPr>
+                                      <m:t>𝑖</m:t>
+                                    </m:r>
+                                  </m:sub>
+                                </m:sSub>
+                                <m:r>
+                                  <a:rPr lang="en-US" i="0" dirty="0">
+                                    <a:latin typeface="Cambria Math" panose="02040503050406030204" pitchFamily="18" charset="0"/>
+                                  </a:rPr>
+                                  <m:t>−</m:t>
+                                </m:r>
+                                <m:sSub>
+                                  <m:sSubPr>
+                                    <m:ctrlPr>
+                                      <a:rPr lang="en-US" i="1" dirty="0">
+                                        <a:latin typeface="Cambria Math" panose="02040503050406030204" pitchFamily="18" charset="0"/>
+                                      </a:rPr>
+                                    </m:ctrlPr>
+                                  </m:sSubPr>
+                                  <m:e>
+                                    <m:r>
+                                      <a:rPr lang="en-US" i="1" dirty="0">
+                                        <a:latin typeface="Cambria Math" panose="02040503050406030204" pitchFamily="18" charset="0"/>
+                                      </a:rPr>
+                                      <m:t>𝑦</m:t>
+                                    </m:r>
+                                  </m:e>
+                                  <m:sub>
+                                    <m:r>
+                                      <a:rPr lang="en-US" i="1" dirty="0">
+                                        <a:latin typeface="Cambria Math" panose="02040503050406030204" pitchFamily="18" charset="0"/>
+                                      </a:rPr>
+                                      <m:t>𝑖</m:t>
+                                    </m:r>
+                                  </m:sub>
+                                </m:sSub>
+                              </m:e>
+                            </m:d>
+                          </m:e>
+                          <m:sup>
+                            <m:r>
+                              <a:rPr lang="en-US" i="0" dirty="0">
+                                <a:latin typeface="Cambria Math" panose="02040503050406030204" pitchFamily="18" charset="0"/>
+                              </a:rPr>
+                              <m:t>2</m:t>
+                            </m:r>
+                          </m:sup>
+                        </m:sSup>
+                      </m:e>
+                    </m:nary>
+                  </m:oMath>
+                </a14:m>
+                <a:endParaRPr lang="en-US" dirty="0"/>
+              </a:p>
+            </p:txBody>
+          </p:sp>
+        </mc:Choice>
+        <mc:Fallback>
+          <p:sp>
+            <p:nvSpPr>
+              <p:cNvPr id="3" name="Content Placeholder 2">
+                <a:extLst>
+                  <a:ext uri="{FF2B5EF4-FFF2-40B4-BE49-F238E27FC236}">
+                    <a16:creationId xmlns:a16="http://schemas.microsoft.com/office/drawing/2014/main" id="{712DF191-358B-4A00-8866-E00D1F4ADC87}"/>
+                  </a:ext>
+                </a:extLst>
+              </p:cNvPr>
+              <p:cNvSpPr>
+                <a:spLocks noGrp="1" noRot="1" noChangeAspect="1" noMove="1" noResize="1" noEditPoints="1" noAdjustHandles="1" noChangeArrowheads="1" noChangeShapeType="1" noTextEdit="1"/>
+              </p:cNvSpPr>
+              <p:nvPr>
+                <p:ph idx="1"/>
+              </p:nvPr>
+            </p:nvSpPr>
+            <p:spPr>
+              <a:blipFill>
+                <a:blip r:embed="rId2"/>
+                <a:stretch>
+                  <a:fillRect l="-1043" t="-2241"/>
+                </a:stretch>
+              </a:blipFill>
+            </p:spPr>
+            <p:txBody>
+              <a:bodyPr/>
+              <a:lstStyle/>
+              <a:p>
+                <a:r>
+                  <a:rPr lang="en-US">
+                    <a:noFill/>
+                  </a:rPr>
+                  <a:t> </a:t>
+                </a:r>
+              </a:p>
+            </p:txBody>
+          </p:sp>
+        </mc:Fallback>
+      </mc:AlternateContent>
+    </p:spTree>
+    <p:extLst>
+      <p:ext uri="{BB962C8B-B14F-4D97-AF65-F5344CB8AC3E}">
+        <p14:creationId xmlns:p14="http://schemas.microsoft.com/office/powerpoint/2010/main" val="2244206585"/>
+      </p:ext>
+    </p:extLst>
+  </p:cSld>
+  <p:clrMapOvr>
+    <a:masterClrMapping/>
+  </p:clrMapOvr>
+</p:sld>
+</file>
+
+<file path=ppt/slides/slide14.xml><?xml version="1.0" encoding="utf-8"?>
+<p:sld xmlns:a="http://schemas.openxmlformats.org/drawingml/2006/main" xmlns:r="http://schemas.openxmlformats.org/officeDocument/2006/relationships" xmlns:p="http://schemas.openxmlformats.org/presentationml/2006/main">
+  <p:cSld>
+    <p:spTree>
+      <p:nvGrpSpPr>
+        <p:cNvPr id="1" name=""/>
+        <p:cNvGrpSpPr/>
+        <p:nvPr/>
+      </p:nvGrpSpPr>
+      <p:grpSpPr>
+        <a:xfrm>
+          <a:off x="0" y="0"/>
+          <a:ext cx="0" cy="0"/>
+          <a:chOff x="0" y="0"/>
+          <a:chExt cx="0" cy="0"/>
+        </a:xfrm>
+      </p:grpSpPr>
+      <p:sp>
+        <p:nvSpPr>
+          <p:cNvPr id="2" name="Title 1">
+            <a:extLst>
+              <a:ext uri="{FF2B5EF4-FFF2-40B4-BE49-F238E27FC236}">
+                <a16:creationId xmlns:a16="http://schemas.microsoft.com/office/drawing/2014/main" id="{C4D1E0AD-60FF-4994-BF3D-3825049A57D9}"/>
+              </a:ext>
+            </a:extLst>
+          </p:cNvPr>
+          <p:cNvSpPr>
+            <a:spLocks noGrp="1"/>
+          </p:cNvSpPr>
+          <p:nvPr>
+            <p:ph type="title"/>
+          </p:nvPr>
+        </p:nvSpPr>
+        <p:spPr/>
+        <p:txBody>
+          <a:bodyPr/>
+          <a:lstStyle/>
+          <a:p>
+            <a:r>
+              <a:rPr lang="en-US" dirty="0"/>
+              <a:t>L1-norm (regression)</a:t>
+            </a:r>
+          </a:p>
+        </p:txBody>
+      </p:sp>
+      <mc:AlternateContent xmlns:mc="http://schemas.openxmlformats.org/markup-compatibility/2006">
+        <mc:Choice xmlns:a14="http://schemas.microsoft.com/office/drawing/2010/main" Requires="a14">
+          <p:sp>
+            <p:nvSpPr>
+              <p:cNvPr id="3" name="Content Placeholder 2">
+                <a:extLst>
+                  <a:ext uri="{FF2B5EF4-FFF2-40B4-BE49-F238E27FC236}">
+                    <a16:creationId xmlns:a16="http://schemas.microsoft.com/office/drawing/2014/main" id="{7538B06C-9F6D-4862-9B95-7D5A2C20ED0E}"/>
+                  </a:ext>
+                </a:extLst>
+              </p:cNvPr>
+              <p:cNvSpPr>
+                <a:spLocks noGrp="1"/>
+              </p:cNvSpPr>
+              <p:nvPr>
+                <p:ph idx="1"/>
+              </p:nvPr>
+            </p:nvSpPr>
+            <p:spPr/>
+            <p:txBody>
+              <a:bodyPr/>
+              <a:lstStyle/>
+              <a:p>
+                <a14:m>
+                  <m:oMath xmlns:m="http://schemas.openxmlformats.org/officeDocument/2006/math">
+                    <m:sSub>
+                      <m:sSubPr>
+                        <m:ctrlPr>
+                          <a:rPr lang="en-US" i="1" smtClean="0">
+                            <a:latin typeface="Cambria Math" panose="02040503050406030204" pitchFamily="18" charset="0"/>
+                          </a:rPr>
+                        </m:ctrlPr>
+                      </m:sSubPr>
+                      <m:e>
+                        <m:d>
+                          <m:dPr>
+                            <m:begChr m:val="‖"/>
+                            <m:endChr m:val="‖"/>
+                            <m:ctrlPr>
+                              <a:rPr lang="en-US" i="1">
+                                <a:latin typeface="Cambria Math" panose="02040503050406030204" pitchFamily="18" charset="0"/>
+                              </a:rPr>
+                            </m:ctrlPr>
+                          </m:dPr>
+                          <m:e>
+                            <m:r>
+                              <a:rPr lang="en-US" i="1">
+                                <a:latin typeface="Cambria Math" panose="02040503050406030204" pitchFamily="18" charset="0"/>
+                              </a:rPr>
+                              <m:t>𝑥</m:t>
+                            </m:r>
+                          </m:e>
+                        </m:d>
+                      </m:e>
+                      <m:sub>
+                        <m:r>
+                          <a:rPr lang="en-US" b="0" i="1" smtClean="0">
+                            <a:latin typeface="Cambria Math" panose="02040503050406030204" pitchFamily="18" charset="0"/>
+                          </a:rPr>
+                          <m:t>1</m:t>
+                        </m:r>
+                      </m:sub>
+                    </m:sSub>
+                    <m:r>
+                      <a:rPr lang="en-US">
+                        <a:latin typeface="Cambria Math" panose="02040503050406030204" pitchFamily="18" charset="0"/>
+                      </a:rPr>
+                      <m:t>=</m:t>
+                    </m:r>
+                    <m:r>
+                      <a:rPr lang="en-US" b="0" i="0" smtClean="0">
+                        <a:latin typeface="Cambria Math" panose="02040503050406030204" pitchFamily="18" charset="0"/>
+                      </a:rPr>
+                      <m:t> </m:t>
+                    </m:r>
+                    <m:d>
+                      <m:dPr>
+                        <m:begChr m:val="|"/>
+                        <m:endChr m:val="|"/>
+                        <m:ctrlPr>
+                          <a:rPr lang="en-US" dirty="0" smtClean="0">
+                            <a:latin typeface="Cambria Math" panose="02040503050406030204" pitchFamily="18" charset="0"/>
+                          </a:rPr>
+                        </m:ctrlPr>
+                      </m:dPr>
+                      <m:e>
+                        <m:sSub>
+                          <m:sSubPr>
+                            <m:ctrlPr>
+                              <a:rPr lang="en-US" dirty="0">
+                                <a:latin typeface="Cambria Math" panose="02040503050406030204" pitchFamily="18" charset="0"/>
+                              </a:rPr>
+                            </m:ctrlPr>
+                          </m:sSubPr>
+                          <m:e>
+                            <m:r>
+                              <a:rPr lang="en-US" i="1" dirty="0">
+                                <a:latin typeface="Cambria Math" panose="02040503050406030204" pitchFamily="18" charset="0"/>
+                              </a:rPr>
+                              <m:t>𝑥</m:t>
+                            </m:r>
+                          </m:e>
+                          <m:sub>
+                            <m:r>
+                              <a:rPr lang="en-US" i="0" dirty="0">
+                                <a:latin typeface="Cambria Math" panose="02040503050406030204" pitchFamily="18" charset="0"/>
+                              </a:rPr>
+                              <m:t>1</m:t>
+                            </m:r>
+                          </m:sub>
+                        </m:sSub>
+                      </m:e>
+                    </m:d>
+                    <m:r>
+                      <a:rPr lang="en-US" i="0" dirty="0">
+                        <a:latin typeface="Cambria Math" panose="02040503050406030204" pitchFamily="18" charset="0"/>
+                      </a:rPr>
+                      <m:t>+</m:t>
+                    </m:r>
+                    <m:d>
+                      <m:dPr>
+                        <m:begChr m:val="|"/>
+                        <m:endChr m:val="|"/>
+                        <m:ctrlPr>
+                          <a:rPr lang="en-US" i="1" dirty="0">
+                            <a:latin typeface="Cambria Math" panose="02040503050406030204" pitchFamily="18" charset="0"/>
+                          </a:rPr>
+                        </m:ctrlPr>
+                      </m:dPr>
+                      <m:e>
+                        <m:sSub>
+                          <m:sSubPr>
+                            <m:ctrlPr>
+                              <a:rPr lang="en-US" i="1" dirty="0">
+                                <a:latin typeface="Cambria Math" panose="02040503050406030204" pitchFamily="18" charset="0"/>
+                              </a:rPr>
+                            </m:ctrlPr>
+                          </m:sSubPr>
+                          <m:e>
+                            <m:r>
+                              <a:rPr lang="en-US" i="1" dirty="0">
+                                <a:latin typeface="Cambria Math" panose="02040503050406030204" pitchFamily="18" charset="0"/>
+                              </a:rPr>
+                              <m:t>𝑥</m:t>
+                            </m:r>
+                          </m:e>
+                          <m:sub>
+                            <m:r>
+                              <a:rPr lang="en-US" i="0" dirty="0">
+                                <a:latin typeface="Cambria Math" panose="02040503050406030204" pitchFamily="18" charset="0"/>
+                              </a:rPr>
+                              <m:t>2</m:t>
+                            </m:r>
+                          </m:sub>
+                        </m:sSub>
+                      </m:e>
+                    </m:d>
+                    <m:r>
+                      <a:rPr lang="en-US" i="0" dirty="0">
+                        <a:latin typeface="Cambria Math" panose="02040503050406030204" pitchFamily="18" charset="0"/>
+                      </a:rPr>
+                      <m:t>+…+</m:t>
+                    </m:r>
+                    <m:d>
+                      <m:dPr>
+                        <m:begChr m:val="|"/>
+                        <m:endChr m:val="|"/>
+                        <m:ctrlPr>
+                          <a:rPr lang="en-US" i="1" dirty="0">
+                            <a:latin typeface="Cambria Math" panose="02040503050406030204" pitchFamily="18" charset="0"/>
+                          </a:rPr>
+                        </m:ctrlPr>
+                      </m:dPr>
+                      <m:e>
+                        <m:sSub>
+                          <m:sSubPr>
+                            <m:ctrlPr>
+                              <a:rPr lang="en-US" i="1" dirty="0">
+                                <a:latin typeface="Cambria Math" panose="02040503050406030204" pitchFamily="18" charset="0"/>
+                              </a:rPr>
+                            </m:ctrlPr>
+                          </m:sSubPr>
+                          <m:e>
+                            <m:r>
+                              <a:rPr lang="en-US" i="1" dirty="0">
+                                <a:latin typeface="Cambria Math" panose="02040503050406030204" pitchFamily="18" charset="0"/>
+                              </a:rPr>
+                              <m:t>𝑥</m:t>
+                            </m:r>
+                          </m:e>
+                          <m:sub>
+                            <m:r>
+                              <a:rPr lang="en-US" i="1" dirty="0">
+                                <a:latin typeface="Cambria Math" panose="02040503050406030204" pitchFamily="18" charset="0"/>
+                              </a:rPr>
+                              <m:t>𝑛</m:t>
+                            </m:r>
+                          </m:sub>
+                        </m:sSub>
+                      </m:e>
+                    </m:d>
+                  </m:oMath>
+                </a14:m>
+                <a:endParaRPr lang="en-US" dirty="0"/>
+              </a:p>
+            </p:txBody>
+          </p:sp>
+        </mc:Choice>
+        <mc:Fallback>
+          <p:sp>
+            <p:nvSpPr>
+              <p:cNvPr id="3" name="Content Placeholder 2">
+                <a:extLst>
+                  <a:ext uri="{FF2B5EF4-FFF2-40B4-BE49-F238E27FC236}">
+                    <a16:creationId xmlns:a16="http://schemas.microsoft.com/office/drawing/2014/main" id="{7538B06C-9F6D-4862-9B95-7D5A2C20ED0E}"/>
+                  </a:ext>
+                </a:extLst>
+              </p:cNvPr>
+              <p:cNvSpPr>
+                <a:spLocks noGrp="1" noRot="1" noChangeAspect="1" noMove="1" noResize="1" noEditPoints="1" noAdjustHandles="1" noChangeArrowheads="1" noChangeShapeType="1" noTextEdit="1"/>
+              </p:cNvSpPr>
+              <p:nvPr>
+                <p:ph idx="1"/>
+              </p:nvPr>
+            </p:nvSpPr>
+            <p:spPr>
+              <a:blipFill>
+                <a:blip r:embed="rId2"/>
+                <a:stretch>
+                  <a:fillRect/>
+                </a:stretch>
+              </a:blipFill>
+            </p:spPr>
+            <p:txBody>
+              <a:bodyPr/>
+              <a:lstStyle/>
+              <a:p>
+                <a:r>
+                  <a:rPr lang="en-US">
+                    <a:noFill/>
+                  </a:rPr>
+                  <a:t> </a:t>
+                </a:r>
+              </a:p>
+            </p:txBody>
+          </p:sp>
+        </mc:Fallback>
+      </mc:AlternateContent>
+    </p:spTree>
+    <p:extLst>
+      <p:ext uri="{BB962C8B-B14F-4D97-AF65-F5344CB8AC3E}">
+        <p14:creationId xmlns:p14="http://schemas.microsoft.com/office/powerpoint/2010/main" val="1834563245"/>
+      </p:ext>
+    </p:extLst>
+  </p:cSld>
+  <p:clrMapOvr>
+    <a:masterClrMapping/>
+  </p:clrMapOvr>
+</p:sld>
+</file>
+
+<file path=ppt/slides/slide15.xml><?xml version="1.0" encoding="utf-8"?>
+<p:sld xmlns:a="http://schemas.openxmlformats.org/drawingml/2006/main" xmlns:r="http://schemas.openxmlformats.org/officeDocument/2006/relationships" xmlns:p="http://schemas.openxmlformats.org/presentationml/2006/main">
+  <p:cSld>
+    <p:spTree>
+      <p:nvGrpSpPr>
+        <p:cNvPr id="1" name=""/>
+        <p:cNvGrpSpPr/>
+        <p:nvPr/>
+      </p:nvGrpSpPr>
+      <p:grpSpPr>
+        <a:xfrm>
+          <a:off x="0" y="0"/>
+          <a:ext cx="0" cy="0"/>
+          <a:chOff x="0" y="0"/>
+          <a:chExt cx="0" cy="0"/>
+        </a:xfrm>
+      </p:grpSpPr>
+      <p:sp>
+        <p:nvSpPr>
+          <p:cNvPr id="2" name="Title 1">
+            <a:extLst>
+              <a:ext uri="{FF2B5EF4-FFF2-40B4-BE49-F238E27FC236}">
+                <a16:creationId xmlns:a16="http://schemas.microsoft.com/office/drawing/2014/main" id="{28401E70-97C3-4E74-9385-D15FC5ABBA98}"/>
+              </a:ext>
+            </a:extLst>
+          </p:cNvPr>
+          <p:cNvSpPr>
+            <a:spLocks noGrp="1"/>
+          </p:cNvSpPr>
+          <p:nvPr>
+            <p:ph type="title"/>
+          </p:nvPr>
+        </p:nvSpPr>
+        <p:spPr/>
+        <p:txBody>
+          <a:bodyPr/>
+          <a:lstStyle/>
+          <a:p>
+            <a:r>
+              <a:rPr lang="en-US" dirty="0"/>
+              <a:t>Mean Absolute Error</a:t>
+            </a:r>
+          </a:p>
+        </p:txBody>
+      </p:sp>
+      <mc:AlternateContent xmlns:mc="http://schemas.openxmlformats.org/markup-compatibility/2006">
+        <mc:Choice xmlns:a14="http://schemas.microsoft.com/office/drawing/2010/main" Requires="a14">
+          <p:sp>
+            <p:nvSpPr>
+              <p:cNvPr id="3" name="Content Placeholder 2">
+                <a:extLst>
+                  <a:ext uri="{FF2B5EF4-FFF2-40B4-BE49-F238E27FC236}">
+                    <a16:creationId xmlns:a16="http://schemas.microsoft.com/office/drawing/2014/main" id="{8587EFBF-75A1-4ABF-A936-842F5E21502D}"/>
+                  </a:ext>
+                </a:extLst>
+              </p:cNvPr>
+              <p:cNvSpPr>
+                <a:spLocks noGrp="1"/>
+              </p:cNvSpPr>
+              <p:nvPr>
+                <p:ph idx="1"/>
+              </p:nvPr>
+            </p:nvSpPr>
+            <p:spPr/>
+            <p:txBody>
+              <a:bodyPr/>
+              <a:lstStyle/>
+              <a:p>
+                <a:r>
+                  <a:rPr lang="en-US" dirty="0"/>
+                  <a:t>MAE = </a:t>
+                </a:r>
+                <a14:m>
+                  <m:oMath xmlns:m="http://schemas.openxmlformats.org/officeDocument/2006/math">
+                    <m:f>
+                      <m:fPr>
+                        <m:ctrlPr>
+                          <a:rPr lang="en-US" i="1" dirty="0">
+                            <a:latin typeface="Cambria Math" panose="02040503050406030204" pitchFamily="18" charset="0"/>
+                          </a:rPr>
+                        </m:ctrlPr>
+                      </m:fPr>
+                      <m:num>
+                        <m:r>
+                          <a:rPr lang="en-US" dirty="0">
+                            <a:latin typeface="Cambria Math" panose="02040503050406030204" pitchFamily="18" charset="0"/>
+                          </a:rPr>
+                          <m:t>1</m:t>
+                        </m:r>
+                      </m:num>
+                      <m:den>
+                        <m:r>
+                          <a:rPr lang="en-US" i="1" dirty="0">
+                            <a:latin typeface="Cambria Math" panose="02040503050406030204" pitchFamily="18" charset="0"/>
+                          </a:rPr>
+                          <m:t>𝑁</m:t>
+                        </m:r>
+                      </m:den>
+                    </m:f>
+                    <m:nary>
+                      <m:naryPr>
+                        <m:chr m:val="∑"/>
+                        <m:limLoc m:val="undOvr"/>
+                        <m:grow m:val="on"/>
+                        <m:ctrlPr>
+                          <a:rPr lang="en-US" i="1" dirty="0">
+                            <a:latin typeface="Cambria Math" panose="02040503050406030204" pitchFamily="18" charset="0"/>
+                          </a:rPr>
+                        </m:ctrlPr>
+                      </m:naryPr>
+                      <m:sub>
+                        <m:r>
+                          <a:rPr lang="en-US" i="1" dirty="0">
+                            <a:latin typeface="Cambria Math" panose="02040503050406030204" pitchFamily="18" charset="0"/>
+                          </a:rPr>
+                          <m:t>𝑖</m:t>
+                        </m:r>
+                        <m:r>
+                          <a:rPr lang="en-US" dirty="0">
+                            <a:latin typeface="Cambria Math" panose="02040503050406030204" pitchFamily="18" charset="0"/>
+                          </a:rPr>
+                          <m:t>=1</m:t>
+                        </m:r>
+                      </m:sub>
+                      <m:sup>
+                        <m:r>
+                          <a:rPr lang="en-US" i="1" dirty="0">
+                            <a:latin typeface="Cambria Math" panose="02040503050406030204" pitchFamily="18" charset="0"/>
+                          </a:rPr>
+                          <m:t>𝑁</m:t>
+                        </m:r>
+                      </m:sup>
+                      <m:e>
+                        <m:d>
+                          <m:dPr>
+                            <m:begChr m:val="|"/>
+                            <m:endChr m:val="|"/>
+                            <m:ctrlPr>
+                              <a:rPr lang="en-US" i="1" dirty="0" smtClean="0">
+                                <a:latin typeface="Cambria Math" panose="02040503050406030204" pitchFamily="18" charset="0"/>
+                              </a:rPr>
+                            </m:ctrlPr>
+                          </m:dPr>
+                          <m:e>
+                            <m:sSub>
+                              <m:sSubPr>
+                                <m:ctrlPr>
+                                  <a:rPr lang="en-US" i="1" dirty="0">
+                                    <a:latin typeface="Cambria Math" panose="02040503050406030204" pitchFamily="18" charset="0"/>
+                                  </a:rPr>
+                                </m:ctrlPr>
+                              </m:sSubPr>
+                              <m:e>
+                                <m:acc>
+                                  <m:accPr>
+                                    <m:chr m:val="̂"/>
+                                    <m:ctrlPr>
+                                      <a:rPr lang="en-US" i="1" dirty="0">
+                                        <a:latin typeface="Cambria Math" panose="02040503050406030204" pitchFamily="18" charset="0"/>
+                                      </a:rPr>
+                                    </m:ctrlPr>
+                                  </m:accPr>
+                                  <m:e>
+                                    <m:r>
+                                      <a:rPr lang="en-US" i="1" dirty="0">
+                                        <a:latin typeface="Cambria Math" panose="02040503050406030204" pitchFamily="18" charset="0"/>
+                                      </a:rPr>
+                                      <m:t>𝑦</m:t>
+                                    </m:r>
+                                  </m:e>
+                                </m:acc>
+                              </m:e>
+                              <m:sub>
+                                <m:r>
+                                  <a:rPr lang="en-US" i="1" dirty="0">
+                                    <a:latin typeface="Cambria Math" panose="02040503050406030204" pitchFamily="18" charset="0"/>
+                                  </a:rPr>
+                                  <m:t>𝑖</m:t>
+                                </m:r>
+                              </m:sub>
+                            </m:sSub>
+                            <m:r>
+                              <a:rPr lang="en-US" i="1" dirty="0">
+                                <a:latin typeface="Cambria Math" panose="02040503050406030204" pitchFamily="18" charset="0"/>
+                              </a:rPr>
+                              <m:t>−</m:t>
+                            </m:r>
+                            <m:sSub>
+                              <m:sSubPr>
+                                <m:ctrlPr>
+                                  <a:rPr lang="en-US" i="1" dirty="0">
+                                    <a:latin typeface="Cambria Math" panose="02040503050406030204" pitchFamily="18" charset="0"/>
+                                  </a:rPr>
+                                </m:ctrlPr>
+                              </m:sSubPr>
+                              <m:e>
+                                <m:r>
+                                  <a:rPr lang="en-US" i="1" dirty="0">
+                                    <a:latin typeface="Cambria Math" panose="02040503050406030204" pitchFamily="18" charset="0"/>
+                                  </a:rPr>
+                                  <m:t>𝑦</m:t>
+                                </m:r>
+                              </m:e>
+                              <m:sub>
+                                <m:r>
+                                  <a:rPr lang="en-US" i="1" dirty="0">
+                                    <a:latin typeface="Cambria Math" panose="02040503050406030204" pitchFamily="18" charset="0"/>
+                                  </a:rPr>
+                                  <m:t>𝑖</m:t>
+                                </m:r>
+                              </m:sub>
+                            </m:sSub>
+                          </m:e>
+                        </m:d>
+                      </m:e>
+                    </m:nary>
+                  </m:oMath>
+                </a14:m>
+                <a:endParaRPr lang="en-US" dirty="0"/>
+              </a:p>
+            </p:txBody>
+          </p:sp>
+        </mc:Choice>
+        <mc:Fallback>
+          <p:sp>
+            <p:nvSpPr>
+              <p:cNvPr id="3" name="Content Placeholder 2">
+                <a:extLst>
+                  <a:ext uri="{FF2B5EF4-FFF2-40B4-BE49-F238E27FC236}">
+                    <a16:creationId xmlns:a16="http://schemas.microsoft.com/office/drawing/2014/main" id="{8587EFBF-75A1-4ABF-A936-842F5E21502D}"/>
+                  </a:ext>
+                </a:extLst>
+              </p:cNvPr>
+              <p:cNvSpPr>
+                <a:spLocks noGrp="1" noRot="1" noChangeAspect="1" noMove="1" noResize="1" noEditPoints="1" noAdjustHandles="1" noChangeArrowheads="1" noChangeShapeType="1" noTextEdit="1"/>
+              </p:cNvSpPr>
+              <p:nvPr>
+                <p:ph idx="1"/>
+              </p:nvPr>
+            </p:nvSpPr>
+            <p:spPr>
+              <a:blipFill>
+                <a:blip r:embed="rId2"/>
+                <a:stretch>
+                  <a:fillRect l="-1043" t="-280"/>
+                </a:stretch>
+              </a:blipFill>
+            </p:spPr>
+            <p:txBody>
+              <a:bodyPr/>
+              <a:lstStyle/>
+              <a:p>
+                <a:r>
+                  <a:rPr lang="en-US">
+                    <a:noFill/>
+                  </a:rPr>
+                  <a:t> </a:t>
+                </a:r>
+              </a:p>
+            </p:txBody>
+          </p:sp>
+        </mc:Fallback>
+      </mc:AlternateContent>
+    </p:spTree>
+    <p:extLst>
+      <p:ext uri="{BB962C8B-B14F-4D97-AF65-F5344CB8AC3E}">
+        <p14:creationId xmlns:p14="http://schemas.microsoft.com/office/powerpoint/2010/main" val="694391417"/>
+      </p:ext>
+    </p:extLst>
+  </p:cSld>
+  <p:clrMapOvr>
+    <a:masterClrMapping/>
+  </p:clrMapOvr>
+</p:sld>
+</file>
+
+<file path=ppt/slides/slide16.xml><?xml version="1.0" encoding="utf-8"?>
+<p:sld xmlns:a="http://schemas.openxmlformats.org/drawingml/2006/main" xmlns:r="http://schemas.openxmlformats.org/officeDocument/2006/relationships" xmlns:p="http://schemas.openxmlformats.org/presentationml/2006/main">
+  <p:cSld>
+    <p:spTree>
+      <p:nvGrpSpPr>
+        <p:cNvPr id="1" name=""/>
+        <p:cNvGrpSpPr/>
+        <p:nvPr/>
+      </p:nvGrpSpPr>
+      <p:grpSpPr>
+        <a:xfrm>
+          <a:off x="0" y="0"/>
+          <a:ext cx="0" cy="0"/>
+          <a:chOff x="0" y="0"/>
+          <a:chExt cx="0" cy="0"/>
+        </a:xfrm>
+      </p:grpSpPr>
+      <p:sp>
+        <p:nvSpPr>
+          <p:cNvPr id="2" name="Title 1">
+            <a:extLst>
+              <a:ext uri="{FF2B5EF4-FFF2-40B4-BE49-F238E27FC236}">
+                <a16:creationId xmlns:a16="http://schemas.microsoft.com/office/drawing/2014/main" id="{A7E2C516-DA78-480A-9894-FDE77989D060}"/>
+              </a:ext>
+            </a:extLst>
+          </p:cNvPr>
+          <p:cNvSpPr>
+            <a:spLocks noGrp="1"/>
+          </p:cNvSpPr>
+          <p:nvPr>
+            <p:ph type="title"/>
+          </p:nvPr>
+        </p:nvSpPr>
+        <p:spPr/>
+        <p:txBody>
+          <a:bodyPr/>
+          <a:lstStyle/>
+          <a:p>
+            <a:r>
+              <a:rPr lang="en-US" dirty="0"/>
+              <a:t>Cross entropy</a:t>
+            </a:r>
+          </a:p>
+        </p:txBody>
+      </p:sp>
+      <mc:AlternateContent xmlns:mc="http://schemas.openxmlformats.org/markup-compatibility/2006">
+        <mc:Choice xmlns:a14="http://schemas.microsoft.com/office/drawing/2010/main" Requires="a14">
+          <p:sp>
+            <p:nvSpPr>
+              <p:cNvPr id="3" name="Content Placeholder 2">
+                <a:extLst>
+                  <a:ext uri="{FF2B5EF4-FFF2-40B4-BE49-F238E27FC236}">
+                    <a16:creationId xmlns:a16="http://schemas.microsoft.com/office/drawing/2014/main" id="{1DC0BB66-77DF-4A13-9048-2C72B6F053AA}"/>
+                  </a:ext>
+                </a:extLst>
+              </p:cNvPr>
+              <p:cNvSpPr>
+                <a:spLocks noGrp="1"/>
+              </p:cNvSpPr>
+              <p:nvPr>
+                <p:ph idx="1"/>
+              </p:nvPr>
+            </p:nvSpPr>
+            <p:spPr/>
+            <p:txBody>
+              <a:bodyPr/>
+              <a:lstStyle/>
+              <a:p>
+                <a:r>
+                  <a:rPr lang="en-US" b="0" i="0" dirty="0">
+                    <a:latin typeface="Cambria Math" panose="02040503050406030204" pitchFamily="18" charset="0"/>
+                  </a:rPr>
+                  <a:t>Measures the distance between distributions</a:t>
+                </a:r>
+              </a:p>
+              <a:p>
+                <a14:m>
+                  <m:oMath xmlns:m="http://schemas.openxmlformats.org/officeDocument/2006/math">
+                    <m:r>
+                      <m:rPr>
+                        <m:sty m:val="p"/>
+                      </m:rPr>
+                      <a:rPr lang="en-US" b="0" i="0" smtClean="0">
+                        <a:latin typeface="Cambria Math" panose="02040503050406030204" pitchFamily="18" charset="0"/>
+                      </a:rPr>
+                      <m:t>H</m:t>
+                    </m:r>
+                    <m:d>
+                      <m:dPr>
+                        <m:ctrlPr>
+                          <a:rPr lang="en-US" b="0" i="0" smtClean="0">
+                            <a:latin typeface="Cambria Math" panose="02040503050406030204" pitchFamily="18" charset="0"/>
+                          </a:rPr>
+                        </m:ctrlPr>
+                      </m:dPr>
+                      <m:e>
+                        <m:r>
+                          <m:rPr>
+                            <m:sty m:val="p"/>
+                          </m:rPr>
+                          <a:rPr lang="en-US" b="0" i="0" smtClean="0">
+                            <a:latin typeface="Cambria Math" panose="02040503050406030204" pitchFamily="18" charset="0"/>
+                          </a:rPr>
+                          <m:t>y</m:t>
+                        </m:r>
+                        <m:r>
+                          <a:rPr lang="en-US" b="0" i="0" smtClean="0">
+                            <a:latin typeface="Cambria Math" panose="02040503050406030204" pitchFamily="18" charset="0"/>
+                          </a:rPr>
+                          <m:t>,</m:t>
+                        </m:r>
+                        <m:acc>
+                          <m:accPr>
+                            <m:chr m:val="̂"/>
+                            <m:ctrlPr>
+                              <a:rPr lang="en-US" b="0" i="0" smtClean="0">
+                                <a:latin typeface="Cambria Math" panose="02040503050406030204" pitchFamily="18" charset="0"/>
+                              </a:rPr>
+                            </m:ctrlPr>
+                          </m:accPr>
+                          <m:e>
+                            <m:r>
+                              <a:rPr lang="en-US" b="0" i="0" smtClean="0">
+                                <a:latin typeface="Cambria Math" panose="02040503050406030204" pitchFamily="18" charset="0"/>
+                              </a:rPr>
+                              <m:t>𝑦</m:t>
+                            </m:r>
+                          </m:e>
+                        </m:acc>
+                      </m:e>
+                    </m:d>
+                    <m:r>
+                      <a:rPr lang="en-US" b="0" i="0" smtClean="0">
+                        <a:latin typeface="Cambria Math" panose="02040503050406030204" pitchFamily="18" charset="0"/>
+                      </a:rPr>
+                      <m:t>= </m:t>
+                    </m:r>
+                    <m:r>
+                      <a:rPr lang="en-US" smtClean="0">
+                        <a:latin typeface="Cambria Math" panose="02040503050406030204" pitchFamily="18" charset="0"/>
+                      </a:rPr>
+                      <m:t>−</m:t>
+                    </m:r>
+                    <m:nary>
+                      <m:naryPr>
+                        <m:chr m:val="∑"/>
+                        <m:limLoc m:val="undOvr"/>
+                        <m:grow m:val="on"/>
+                        <m:ctrlPr>
+                          <a:rPr lang="en-US" i="1">
+                            <a:latin typeface="Cambria Math" panose="02040503050406030204" pitchFamily="18" charset="0"/>
+                          </a:rPr>
+                        </m:ctrlPr>
+                      </m:naryPr>
+                      <m:sub>
+                        <m:r>
+                          <a:rPr lang="en-US" i="1">
+                            <a:latin typeface="Cambria Math" panose="02040503050406030204" pitchFamily="18" charset="0"/>
+                          </a:rPr>
+                          <m:t>𝑖</m:t>
+                        </m:r>
+                        <m:r>
+                          <a:rPr lang="en-US" i="0">
+                            <a:latin typeface="Cambria Math" panose="02040503050406030204" pitchFamily="18" charset="0"/>
+                          </a:rPr>
+                          <m:t>=0</m:t>
+                        </m:r>
+                      </m:sub>
+                      <m:sup>
+                        <m:r>
+                          <a:rPr lang="en-US" i="1">
+                            <a:latin typeface="Cambria Math" panose="02040503050406030204" pitchFamily="18" charset="0"/>
+                          </a:rPr>
+                          <m:t>𝑛</m:t>
+                        </m:r>
+                      </m:sup>
+                      <m:e>
+                        <m:func>
+                          <m:funcPr>
+                            <m:ctrlPr>
+                              <a:rPr lang="en-US" i="1">
+                                <a:latin typeface="Cambria Math" panose="02040503050406030204" pitchFamily="18" charset="0"/>
+                              </a:rPr>
+                            </m:ctrlPr>
+                          </m:funcPr>
+                          <m:fName>
+                            <m:sSub>
+                              <m:sSubPr>
+                                <m:ctrlPr>
+                                  <a:rPr lang="en-US" b="0" i="0" smtClean="0">
+                                    <a:latin typeface="Cambria Math" panose="02040503050406030204" pitchFamily="18" charset="0"/>
+                                  </a:rPr>
+                                </m:ctrlPr>
+                              </m:sSubPr>
+                              <m:e>
+                                <m:r>
+                                  <m:rPr>
+                                    <m:sty m:val="p"/>
+                                  </m:rPr>
+                                  <a:rPr lang="en-US" b="0" i="0" smtClean="0">
+                                    <a:latin typeface="Cambria Math" panose="02040503050406030204" pitchFamily="18" charset="0"/>
+                                  </a:rPr>
+                                  <m:t>y</m:t>
+                                </m:r>
+                              </m:e>
+                              <m:sub>
+                                <m:r>
+                                  <m:rPr>
+                                    <m:sty m:val="p"/>
+                                  </m:rPr>
+                                  <a:rPr lang="en-US" b="0" i="0" smtClean="0">
+                                    <a:latin typeface="Cambria Math" panose="02040503050406030204" pitchFamily="18" charset="0"/>
+                                  </a:rPr>
+                                  <m:t>i</m:t>
+                                </m:r>
+                              </m:sub>
+                            </m:sSub>
+                            <m:r>
+                              <m:rPr>
+                                <m:sty m:val="p"/>
+                              </m:rPr>
+                              <a:rPr lang="en-US" i="0">
+                                <a:latin typeface="Cambria Math" panose="02040503050406030204" pitchFamily="18" charset="0"/>
+                              </a:rPr>
+                              <m:t>log</m:t>
+                            </m:r>
+                          </m:fName>
+                          <m:e>
+                            <m:d>
+                              <m:dPr>
+                                <m:ctrlPr>
+                                  <a:rPr lang="en-US" i="1">
+                                    <a:latin typeface="Cambria Math" panose="02040503050406030204" pitchFamily="18" charset="0"/>
+                                  </a:rPr>
+                                </m:ctrlPr>
+                              </m:dPr>
+                              <m:e>
+                                <m:sSub>
+                                  <m:sSubPr>
+                                    <m:ctrlPr>
+                                      <a:rPr lang="en-US" b="0" i="1" smtClean="0">
+                                        <a:latin typeface="Cambria Math" panose="02040503050406030204" pitchFamily="18" charset="0"/>
+                                      </a:rPr>
+                                    </m:ctrlPr>
+                                  </m:sSubPr>
+                                  <m:e>
+                                    <m:acc>
+                                      <m:accPr>
+                                        <m:chr m:val="̂"/>
+                                        <m:ctrlPr>
+                                          <a:rPr lang="en-US" b="0" i="1" smtClean="0">
+                                            <a:latin typeface="Cambria Math" panose="02040503050406030204" pitchFamily="18" charset="0"/>
+                                          </a:rPr>
+                                        </m:ctrlPr>
+                                      </m:accPr>
+                                      <m:e>
+                                        <m:r>
+                                          <a:rPr lang="en-US" b="0" i="1" smtClean="0">
+                                            <a:latin typeface="Cambria Math" panose="02040503050406030204" pitchFamily="18" charset="0"/>
+                                          </a:rPr>
+                                          <m:t>𝑦</m:t>
+                                        </m:r>
+                                      </m:e>
+                                    </m:acc>
+                                  </m:e>
+                                  <m:sub>
+                                    <m:r>
+                                      <a:rPr lang="en-US" b="0" i="1" smtClean="0">
+                                        <a:latin typeface="Cambria Math" panose="02040503050406030204" pitchFamily="18" charset="0"/>
+                                      </a:rPr>
+                                      <m:t>𝑖</m:t>
+                                    </m:r>
+                                  </m:sub>
+                                </m:sSub>
+                              </m:e>
+                            </m:d>
+                          </m:e>
+                        </m:func>
+                      </m:e>
+                    </m:nary>
+                  </m:oMath>
+                </a14:m>
+                <a:endParaRPr lang="en-US" dirty="0"/>
+              </a:p>
+            </p:txBody>
+          </p:sp>
+        </mc:Choice>
+        <mc:Fallback>
+          <p:sp>
+            <p:nvSpPr>
+              <p:cNvPr id="3" name="Content Placeholder 2">
+                <a:extLst>
+                  <a:ext uri="{FF2B5EF4-FFF2-40B4-BE49-F238E27FC236}">
+                    <a16:creationId xmlns:a16="http://schemas.microsoft.com/office/drawing/2014/main" id="{1DC0BB66-77DF-4A13-9048-2C72B6F053AA}"/>
+                  </a:ext>
+                </a:extLst>
+              </p:cNvPr>
+              <p:cNvSpPr>
+                <a:spLocks noGrp="1" noRot="1" noChangeAspect="1" noMove="1" noResize="1" noEditPoints="1" noAdjustHandles="1" noChangeArrowheads="1" noChangeShapeType="1" noTextEdit="1"/>
+              </p:cNvSpPr>
+              <p:nvPr>
+                <p:ph idx="1"/>
+              </p:nvPr>
+            </p:nvSpPr>
+            <p:spPr>
+              <a:blipFill>
+                <a:blip r:embed="rId2"/>
+                <a:stretch>
+                  <a:fillRect l="-1043" t="-2381"/>
+                </a:stretch>
+              </a:blipFill>
+            </p:spPr>
+            <p:txBody>
+              <a:bodyPr/>
+              <a:lstStyle/>
+              <a:p>
+                <a:r>
+                  <a:rPr lang="en-US">
+                    <a:noFill/>
+                  </a:rPr>
+                  <a:t> </a:t>
+                </a:r>
+              </a:p>
+            </p:txBody>
+          </p:sp>
+        </mc:Fallback>
+      </mc:AlternateContent>
+    </p:spTree>
+    <p:extLst>
+      <p:ext uri="{BB962C8B-B14F-4D97-AF65-F5344CB8AC3E}">
+        <p14:creationId xmlns:p14="http://schemas.microsoft.com/office/powerpoint/2010/main" val="2665709240"/>
+      </p:ext>
+    </p:extLst>
+  </p:cSld>
+  <p:clrMapOvr>
+    <a:masterClrMapping/>
+  </p:clrMapOvr>
+</p:sld>
+</file>
+
+<file path=ppt/slides/slide17.xml><?xml version="1.0" encoding="utf-8"?>
+<p:sld xmlns:a="http://schemas.openxmlformats.org/drawingml/2006/main" xmlns:r="http://schemas.openxmlformats.org/officeDocument/2006/relationships" xmlns:p="http://schemas.openxmlformats.org/presentationml/2006/main">
+  <p:cSld>
+    <p:spTree>
+      <p:nvGrpSpPr>
+        <p:cNvPr id="1" name=""/>
+        <p:cNvGrpSpPr/>
+        <p:nvPr/>
+      </p:nvGrpSpPr>
+      <p:grpSpPr>
+        <a:xfrm>
+          <a:off x="0" y="0"/>
+          <a:ext cx="0" cy="0"/>
+          <a:chOff x="0" y="0"/>
+          <a:chExt cx="0" cy="0"/>
+        </a:xfrm>
+      </p:grpSpPr>
+      <p:sp>
+        <p:nvSpPr>
+          <p:cNvPr id="4" name="Title 3">
+            <a:extLst>
+              <a:ext uri="{FF2B5EF4-FFF2-40B4-BE49-F238E27FC236}">
+                <a16:creationId xmlns:a16="http://schemas.microsoft.com/office/drawing/2014/main" id="{6FC1FCA4-D71F-4C28-8F8D-47BD8346B22C}"/>
+              </a:ext>
+            </a:extLst>
+          </p:cNvPr>
+          <p:cNvSpPr>
+            <a:spLocks noGrp="1"/>
+          </p:cNvSpPr>
+          <p:nvPr>
+            <p:ph type="title"/>
+          </p:nvPr>
+        </p:nvSpPr>
+        <p:spPr/>
+        <p:txBody>
+          <a:bodyPr/>
+          <a:lstStyle/>
+          <a:p>
+            <a:r>
+              <a:rPr lang="en-US" dirty="0"/>
+              <a:t>Cross-validation</a:t>
+            </a:r>
+          </a:p>
+        </p:txBody>
+      </p:sp>
+      <p:sp>
+        <p:nvSpPr>
+          <p:cNvPr id="5" name="Text Placeholder 4">
+            <a:extLst>
+              <a:ext uri="{FF2B5EF4-FFF2-40B4-BE49-F238E27FC236}">
+                <a16:creationId xmlns:a16="http://schemas.microsoft.com/office/drawing/2014/main" id="{252BFFDF-8CED-420A-9A41-EE9825145240}"/>
+              </a:ext>
+            </a:extLst>
+          </p:cNvPr>
+          <p:cNvSpPr>
+            <a:spLocks noGrp="1"/>
+          </p:cNvSpPr>
+          <p:nvPr>
+            <p:ph type="body" idx="1"/>
+          </p:nvPr>
+        </p:nvSpPr>
+        <p:spPr/>
+        <p:txBody>
+          <a:bodyPr/>
+          <a:lstStyle/>
+          <a:p>
+            <a:r>
+              <a:rPr lang="en-US" dirty="0"/>
+              <a:t>Principled method to train model and test its generalization ability</a:t>
+            </a:r>
+          </a:p>
+        </p:txBody>
+      </p:sp>
+    </p:spTree>
+    <p:extLst>
+      <p:ext uri="{BB962C8B-B14F-4D97-AF65-F5344CB8AC3E}">
+        <p14:creationId xmlns:p14="http://schemas.microsoft.com/office/powerpoint/2010/main" val="2490161273"/>
+      </p:ext>
+    </p:extLst>
+  </p:cSld>
+  <p:clrMapOvr>
+    <a:masterClrMapping/>
+  </p:clrMapOvr>
+</p:sld>
+</file>
+
+<file path=ppt/slides/slide18.xml><?xml version="1.0" encoding="utf-8"?>
+<p:sld xmlns:a="http://schemas.openxmlformats.org/drawingml/2006/main" xmlns:r="http://schemas.openxmlformats.org/officeDocument/2006/relationships" xmlns:p="http://schemas.openxmlformats.org/presentationml/2006/main">
+  <p:cSld>
+    <p:spTree>
+      <p:nvGrpSpPr>
+        <p:cNvPr id="1" name=""/>
+        <p:cNvGrpSpPr/>
+        <p:nvPr/>
+      </p:nvGrpSpPr>
+      <p:grpSpPr>
+        <a:xfrm>
+          <a:off x="0" y="0"/>
+          <a:ext cx="0" cy="0"/>
+          <a:chOff x="0" y="0"/>
+          <a:chExt cx="0" cy="0"/>
+        </a:xfrm>
+      </p:grpSpPr>
+      <p:sp>
+        <p:nvSpPr>
+          <p:cNvPr id="4" name="Title 3">
+            <a:extLst>
+              <a:ext uri="{FF2B5EF4-FFF2-40B4-BE49-F238E27FC236}">
+                <a16:creationId xmlns:a16="http://schemas.microsoft.com/office/drawing/2014/main" id="{EE19BA6B-4CFD-4A19-9929-988DDE564FE8}"/>
+              </a:ext>
+            </a:extLst>
+          </p:cNvPr>
+          <p:cNvSpPr>
+            <a:spLocks noGrp="1"/>
+          </p:cNvSpPr>
+          <p:nvPr>
+            <p:ph type="title"/>
+          </p:nvPr>
+        </p:nvSpPr>
+        <p:spPr/>
+        <p:txBody>
+          <a:bodyPr/>
+          <a:lstStyle/>
+          <a:p>
+            <a:r>
+              <a:rPr lang="en-US" dirty="0"/>
+              <a:t>Cross-validation (train-test split)</a:t>
+            </a:r>
+          </a:p>
+        </p:txBody>
+      </p:sp>
+      <p:sp>
+        <p:nvSpPr>
+          <p:cNvPr id="5" name="Content Placeholder 4">
+            <a:extLst>
+              <a:ext uri="{FF2B5EF4-FFF2-40B4-BE49-F238E27FC236}">
+                <a16:creationId xmlns:a16="http://schemas.microsoft.com/office/drawing/2014/main" id="{03F69C3A-0DB6-4122-ACEB-8A95D9DE5C5A}"/>
+              </a:ext>
+            </a:extLst>
+          </p:cNvPr>
+          <p:cNvSpPr>
+            <a:spLocks noGrp="1"/>
+          </p:cNvSpPr>
+          <p:nvPr>
+            <p:ph idx="1"/>
+          </p:nvPr>
+        </p:nvSpPr>
+        <p:spPr/>
+        <p:txBody>
+          <a:bodyPr/>
+          <a:lstStyle/>
+          <a:p>
+            <a:r>
+              <a:rPr lang="en-US" dirty="0"/>
+              <a:t>If your model is trained on </a:t>
+            </a:r>
+            <a:r>
+              <a:rPr lang="en-US" u="sng" dirty="0"/>
+              <a:t>all</a:t>
+            </a:r>
+            <a:r>
+              <a:rPr lang="en-US" dirty="0"/>
+              <a:t> of your data, then you have no idea how well it will work in the real world</a:t>
+            </a:r>
+          </a:p>
+          <a:p>
+            <a:r>
+              <a:rPr lang="en-US" dirty="0"/>
+              <a:t>Rule of thumb for standard ML is to use</a:t>
+            </a:r>
+          </a:p>
+          <a:p>
+            <a:pPr lvl="1"/>
+            <a:r>
+              <a:rPr lang="en-US" dirty="0"/>
+              <a:t>80% of available data for training</a:t>
+            </a:r>
+          </a:p>
+          <a:p>
+            <a:pPr lvl="1"/>
+            <a:r>
+              <a:rPr lang="en-US" dirty="0"/>
+              <a:t>20% for testing</a:t>
+            </a:r>
+          </a:p>
+          <a:p>
+            <a:r>
+              <a:rPr lang="en-US" dirty="0"/>
+              <a:t>(Deep learning has different rule of thumb)</a:t>
+            </a:r>
+          </a:p>
+        </p:txBody>
+      </p:sp>
+    </p:spTree>
+    <p:extLst>
+      <p:ext uri="{BB962C8B-B14F-4D97-AF65-F5344CB8AC3E}">
+        <p14:creationId xmlns:p14="http://schemas.microsoft.com/office/powerpoint/2010/main" val="2938980518"/>
+      </p:ext>
+    </p:extLst>
+  </p:cSld>
+  <p:clrMapOvr>
+    <a:masterClrMapping/>
+  </p:clrMapOvr>
+</p:sld>
+</file>
+
+<file path=ppt/slides/slide19.xml><?xml version="1.0" encoding="utf-8"?>
+<p:sld xmlns:a="http://schemas.openxmlformats.org/drawingml/2006/main" xmlns:r="http://schemas.openxmlformats.org/officeDocument/2006/relationships" xmlns:p="http://schemas.openxmlformats.org/presentationml/2006/main">
+  <p:cSld>
+    <p:spTree>
+      <p:nvGrpSpPr>
+        <p:cNvPr id="1" name=""/>
+        <p:cNvGrpSpPr/>
+        <p:nvPr/>
+      </p:nvGrpSpPr>
+      <p:grpSpPr>
+        <a:xfrm>
+          <a:off x="0" y="0"/>
+          <a:ext cx="0" cy="0"/>
+          <a:chOff x="0" y="0"/>
+          <a:chExt cx="0" cy="0"/>
+        </a:xfrm>
+      </p:grpSpPr>
+      <p:sp>
+        <p:nvSpPr>
+          <p:cNvPr id="4" name="Title 3">
+            <a:extLst>
+              <a:ext uri="{FF2B5EF4-FFF2-40B4-BE49-F238E27FC236}">
+                <a16:creationId xmlns:a16="http://schemas.microsoft.com/office/drawing/2014/main" id="{60DDC28D-6362-4ECA-964A-3814A0C0F38D}"/>
+              </a:ext>
+            </a:extLst>
+          </p:cNvPr>
+          <p:cNvSpPr>
+            <a:spLocks noGrp="1"/>
+          </p:cNvSpPr>
+          <p:nvPr>
+            <p:ph type="title"/>
+          </p:nvPr>
+        </p:nvSpPr>
+        <p:spPr/>
+        <p:txBody>
+          <a:bodyPr/>
+          <a:lstStyle/>
+          <a:p>
+            <a:r>
+              <a:rPr lang="en-US" dirty="0"/>
+              <a:t>Recent results</a:t>
+            </a:r>
+          </a:p>
+        </p:txBody>
+      </p:sp>
+      <p:sp>
+        <p:nvSpPr>
+          <p:cNvPr id="5" name="Text Placeholder 4">
+            <a:extLst>
+              <a:ext uri="{FF2B5EF4-FFF2-40B4-BE49-F238E27FC236}">
+                <a16:creationId xmlns:a16="http://schemas.microsoft.com/office/drawing/2014/main" id="{5D96A9AA-E138-42C1-8178-7B97F52BD517}"/>
+              </a:ext>
+            </a:extLst>
+          </p:cNvPr>
+          <p:cNvSpPr>
+            <a:spLocks noGrp="1"/>
+          </p:cNvSpPr>
+          <p:nvPr>
+            <p:ph type="body" idx="1"/>
+          </p:nvPr>
+        </p:nvSpPr>
+        <p:spPr/>
+        <p:txBody>
+          <a:bodyPr/>
+          <a:lstStyle/>
+          <a:p>
+            <a:endParaRPr lang="en-US"/>
+          </a:p>
+        </p:txBody>
+      </p:sp>
+    </p:spTree>
+    <p:extLst>
+      <p:ext uri="{BB962C8B-B14F-4D97-AF65-F5344CB8AC3E}">
+        <p14:creationId xmlns:p14="http://schemas.microsoft.com/office/powerpoint/2010/main" val="2305439122"/>
       </p:ext>
     </p:extLst>
   </p:cSld>
@@ -4831,6 +6715,468 @@
     <p:extLst>
       <p:ext uri="{BB962C8B-B14F-4D97-AF65-F5344CB8AC3E}">
         <p14:creationId xmlns:p14="http://schemas.microsoft.com/office/powerpoint/2010/main" val="319812090"/>
+      </p:ext>
+    </p:extLst>
+  </p:cSld>
+  <p:clrMapOvr>
+    <a:masterClrMapping/>
+  </p:clrMapOvr>
+</p:sld>
+</file>
+
+<file path=ppt/slides/slide20.xml><?xml version="1.0" encoding="utf-8"?>
+<p:sld xmlns:a="http://schemas.openxmlformats.org/drawingml/2006/main" xmlns:r="http://schemas.openxmlformats.org/officeDocument/2006/relationships" xmlns:p="http://schemas.openxmlformats.org/presentationml/2006/main">
+  <p:cSld>
+    <p:spTree>
+      <p:nvGrpSpPr>
+        <p:cNvPr id="1" name=""/>
+        <p:cNvGrpSpPr/>
+        <p:nvPr/>
+      </p:nvGrpSpPr>
+      <p:grpSpPr>
+        <a:xfrm>
+          <a:off x="0" y="0"/>
+          <a:ext cx="0" cy="0"/>
+          <a:chOff x="0" y="0"/>
+          <a:chExt cx="0" cy="0"/>
+        </a:xfrm>
+      </p:grpSpPr>
+      <p:sp>
+        <p:nvSpPr>
+          <p:cNvPr id="4" name="Title 3">
+            <a:extLst>
+              <a:ext uri="{FF2B5EF4-FFF2-40B4-BE49-F238E27FC236}">
+                <a16:creationId xmlns:a16="http://schemas.microsoft.com/office/drawing/2014/main" id="{E5A33DC3-B022-4ED9-A3EB-24D2A025666B}"/>
+              </a:ext>
+            </a:extLst>
+          </p:cNvPr>
+          <p:cNvSpPr>
+            <a:spLocks noGrp="1"/>
+          </p:cNvSpPr>
+          <p:nvPr>
+            <p:ph type="title"/>
+          </p:nvPr>
+        </p:nvSpPr>
+        <p:spPr>
+          <a:xfrm>
+            <a:off x="838200" y="877556"/>
+            <a:ext cx="10515600" cy="1325563"/>
+          </a:xfrm>
+        </p:spPr>
+        <p:txBody>
+          <a:bodyPr>
+            <a:normAutofit fontScale="90000"/>
+          </a:bodyPr>
+          <a:lstStyle/>
+          <a:p>
+            <a:r>
+              <a:rPr lang="en-US" b="1" dirty="0"/>
+              <a:t>A Deep Learning Model to Predict a Diagnosis of Alzheimer Disease by Using F-FDG PET of the Brain</a:t>
+            </a:r>
+            <a:br>
+              <a:rPr lang="en-US" b="1" dirty="0"/>
+            </a:br>
+            <a:endParaRPr lang="en-US" dirty="0"/>
+          </a:p>
+        </p:txBody>
+      </p:sp>
+      <p:sp>
+        <p:nvSpPr>
+          <p:cNvPr id="5" name="Content Placeholder 4">
+            <a:extLst>
+              <a:ext uri="{FF2B5EF4-FFF2-40B4-BE49-F238E27FC236}">
+                <a16:creationId xmlns:a16="http://schemas.microsoft.com/office/drawing/2014/main" id="{BE44E09C-1D86-44B3-8043-DCC871E34223}"/>
+              </a:ext>
+            </a:extLst>
+          </p:cNvPr>
+          <p:cNvSpPr>
+            <a:spLocks noGrp="1"/>
+          </p:cNvSpPr>
+          <p:nvPr>
+            <p:ph idx="1"/>
+          </p:nvPr>
+        </p:nvSpPr>
+        <p:spPr>
+          <a:xfrm>
+            <a:off x="838200" y="2473119"/>
+            <a:ext cx="10515600" cy="4351338"/>
+          </a:xfrm>
+        </p:spPr>
+        <p:txBody>
+          <a:bodyPr/>
+          <a:lstStyle/>
+          <a:p>
+            <a:r>
+              <a:rPr lang="en-US" dirty="0"/>
+              <a:t>Training set: 1800 PET images</a:t>
+            </a:r>
+          </a:p>
+          <a:p>
+            <a:r>
+              <a:rPr lang="en-US" dirty="0"/>
+              <a:t>Test set: 200 PET images</a:t>
+            </a:r>
+          </a:p>
+          <a:p>
+            <a:r>
+              <a:rPr lang="en-US" dirty="0"/>
+              <a:t>ROC curve of 0.98</a:t>
+            </a:r>
+          </a:p>
+          <a:p>
+            <a:r>
+              <a:rPr lang="en-US" dirty="0"/>
+              <a:t>82% specificity at 100% sensitivity</a:t>
+            </a:r>
+          </a:p>
+          <a:p>
+            <a:r>
+              <a:rPr lang="en-US" dirty="0"/>
+              <a:t>https://pubs.rsna.org/doi/10.1148/radiol.2018180958</a:t>
+            </a:r>
+          </a:p>
+          <a:p>
+            <a:endParaRPr lang="en-US" dirty="0"/>
+          </a:p>
+        </p:txBody>
+      </p:sp>
+      <p:pic>
+        <p:nvPicPr>
+          <p:cNvPr id="3074" name="Picture 2" descr="brain scans of Alzheimer's patients">
+            <a:extLst>
+              <a:ext uri="{FF2B5EF4-FFF2-40B4-BE49-F238E27FC236}">
+                <a16:creationId xmlns:a16="http://schemas.microsoft.com/office/drawing/2014/main" id="{B226C490-8459-4DD7-BDB0-CABC69C42013}"/>
+              </a:ext>
+            </a:extLst>
+          </p:cNvPr>
+          <p:cNvPicPr>
+            <a:picLocks noChangeAspect="1" noChangeArrowheads="1"/>
+          </p:cNvPicPr>
+          <p:nvPr/>
+        </p:nvPicPr>
+        <p:blipFill>
+          <a:blip r:embed="rId2">
+            <a:extLst>
+              <a:ext uri="{28A0092B-C50C-407E-A947-70E740481C1C}">
+                <a14:useLocalDpi xmlns:a14="http://schemas.microsoft.com/office/drawing/2010/main" val="0"/>
+              </a:ext>
+            </a:extLst>
+          </a:blip>
+          <a:srcRect/>
+          <a:stretch>
+            <a:fillRect/>
+          </a:stretch>
+        </p:blipFill>
+        <p:spPr bwMode="auto">
+          <a:xfrm>
+            <a:off x="9445336" y="4338683"/>
+            <a:ext cx="2439208" cy="2224558"/>
+          </a:xfrm>
+          <a:prstGeom prst="rect">
+            <a:avLst/>
+          </a:prstGeom>
+          <a:noFill/>
+          <a:extLst>
+            <a:ext uri="{909E8E84-426E-40DD-AFC4-6F175D3DCCD1}">
+              <a14:hiddenFill xmlns:a14="http://schemas.microsoft.com/office/drawing/2010/main">
+                <a:solidFill>
+                  <a:srgbClr val="FFFFFF"/>
+                </a:solidFill>
+              </a14:hiddenFill>
+            </a:ext>
+          </a:extLst>
+        </p:spPr>
+      </p:pic>
+      <p:sp>
+        <p:nvSpPr>
+          <p:cNvPr id="6" name="TextBox 5">
+            <a:extLst>
+              <a:ext uri="{FF2B5EF4-FFF2-40B4-BE49-F238E27FC236}">
+                <a16:creationId xmlns:a16="http://schemas.microsoft.com/office/drawing/2014/main" id="{6C24927F-CB18-43C8-B541-B5A6852C4138}"/>
+              </a:ext>
+            </a:extLst>
+          </p:cNvPr>
+          <p:cNvSpPr txBox="1"/>
+          <p:nvPr/>
+        </p:nvSpPr>
+        <p:spPr>
+          <a:xfrm>
+            <a:off x="924791" y="6639791"/>
+            <a:ext cx="184731" cy="369332"/>
+          </a:xfrm>
+          <a:prstGeom prst="rect">
+            <a:avLst/>
+          </a:prstGeom>
+          <a:noFill/>
+        </p:spPr>
+        <p:txBody>
+          <a:bodyPr wrap="none" rtlCol="0">
+            <a:spAutoFit/>
+          </a:bodyPr>
+          <a:lstStyle/>
+          <a:p>
+            <a:endParaRPr lang="en-US" dirty="0"/>
+          </a:p>
+        </p:txBody>
+      </p:sp>
+    </p:spTree>
+    <p:extLst>
+      <p:ext uri="{BB962C8B-B14F-4D97-AF65-F5344CB8AC3E}">
+        <p14:creationId xmlns:p14="http://schemas.microsoft.com/office/powerpoint/2010/main" val="1204881643"/>
+      </p:ext>
+    </p:extLst>
+  </p:cSld>
+  <p:clrMapOvr>
+    <a:masterClrMapping/>
+  </p:clrMapOvr>
+</p:sld>
+</file>
+
+<file path=ppt/slides/slide21.xml><?xml version="1.0" encoding="utf-8"?>
+<p:sld xmlns:a="http://schemas.openxmlformats.org/drawingml/2006/main" xmlns:r="http://schemas.openxmlformats.org/officeDocument/2006/relationships" xmlns:p="http://schemas.openxmlformats.org/presentationml/2006/main">
+  <p:cSld>
+    <p:spTree>
+      <p:nvGrpSpPr>
+        <p:cNvPr id="1" name=""/>
+        <p:cNvGrpSpPr/>
+        <p:nvPr/>
+      </p:nvGrpSpPr>
+      <p:grpSpPr>
+        <a:xfrm>
+          <a:off x="0" y="0"/>
+          <a:ext cx="0" cy="0"/>
+          <a:chOff x="0" y="0"/>
+          <a:chExt cx="0" cy="0"/>
+        </a:xfrm>
+      </p:grpSpPr>
+      <p:sp>
+        <p:nvSpPr>
+          <p:cNvPr id="2" name="Title 1">
+            <a:extLst>
+              <a:ext uri="{FF2B5EF4-FFF2-40B4-BE49-F238E27FC236}">
+                <a16:creationId xmlns:a16="http://schemas.microsoft.com/office/drawing/2014/main" id="{13255413-BDBE-4114-8B67-6BEBE6CAAADD}"/>
+              </a:ext>
+            </a:extLst>
+          </p:cNvPr>
+          <p:cNvSpPr>
+            <a:spLocks noGrp="1"/>
+          </p:cNvSpPr>
+          <p:nvPr>
+            <p:ph type="title"/>
+          </p:nvPr>
+        </p:nvSpPr>
+        <p:spPr/>
+        <p:txBody>
+          <a:bodyPr/>
+          <a:lstStyle/>
+          <a:p>
+            <a:endParaRPr lang="en-US"/>
+          </a:p>
+        </p:txBody>
+      </p:sp>
+      <p:sp>
+        <p:nvSpPr>
+          <p:cNvPr id="3" name="Content Placeholder 2">
+            <a:extLst>
+              <a:ext uri="{FF2B5EF4-FFF2-40B4-BE49-F238E27FC236}">
+                <a16:creationId xmlns:a16="http://schemas.microsoft.com/office/drawing/2014/main" id="{E926E83F-FE05-4DC7-A337-95CCD1E0C137}"/>
+              </a:ext>
+            </a:extLst>
+          </p:cNvPr>
+          <p:cNvSpPr>
+            <a:spLocks noGrp="1"/>
+          </p:cNvSpPr>
+          <p:nvPr>
+            <p:ph idx="1"/>
+          </p:nvPr>
+        </p:nvSpPr>
+        <p:spPr/>
+        <p:txBody>
+          <a:bodyPr/>
+          <a:lstStyle/>
+          <a:p>
+            <a:endParaRPr lang="en-US"/>
+          </a:p>
+        </p:txBody>
+      </p:sp>
+      <p:pic>
+        <p:nvPicPr>
+          <p:cNvPr id="5122" name="Picture 2" descr="Image result for specificity">
+            <a:extLst>
+              <a:ext uri="{FF2B5EF4-FFF2-40B4-BE49-F238E27FC236}">
+                <a16:creationId xmlns:a16="http://schemas.microsoft.com/office/drawing/2014/main" id="{26C136F1-2C5D-43D7-B8D0-69B7566E7A67}"/>
+              </a:ext>
+            </a:extLst>
+          </p:cNvPr>
+          <p:cNvPicPr>
+            <a:picLocks noChangeAspect="1" noChangeArrowheads="1"/>
+          </p:cNvPicPr>
+          <p:nvPr/>
+        </p:nvPicPr>
+        <p:blipFill>
+          <a:blip r:embed="rId2">
+            <a:extLst>
+              <a:ext uri="{28A0092B-C50C-407E-A947-70E740481C1C}">
+                <a14:useLocalDpi xmlns:a14="http://schemas.microsoft.com/office/drawing/2010/main" val="0"/>
+              </a:ext>
+            </a:extLst>
+          </a:blip>
+          <a:srcRect/>
+          <a:stretch>
+            <a:fillRect/>
+          </a:stretch>
+        </p:blipFill>
+        <p:spPr bwMode="auto">
+          <a:xfrm>
+            <a:off x="4429125" y="400050"/>
+            <a:ext cx="3333750" cy="6057900"/>
+          </a:xfrm>
+          <a:prstGeom prst="rect">
+            <a:avLst/>
+          </a:prstGeom>
+          <a:noFill/>
+          <a:extLst>
+            <a:ext uri="{909E8E84-426E-40DD-AFC4-6F175D3DCCD1}">
+              <a14:hiddenFill xmlns:a14="http://schemas.microsoft.com/office/drawing/2010/main">
+                <a:solidFill>
+                  <a:srgbClr val="FFFFFF"/>
+                </a:solidFill>
+              </a14:hiddenFill>
+            </a:ext>
+          </a:extLst>
+        </p:spPr>
+      </p:pic>
+    </p:spTree>
+    <p:extLst>
+      <p:ext uri="{BB962C8B-B14F-4D97-AF65-F5344CB8AC3E}">
+        <p14:creationId xmlns:p14="http://schemas.microsoft.com/office/powerpoint/2010/main" val="3011039131"/>
+      </p:ext>
+    </p:extLst>
+  </p:cSld>
+  <p:clrMapOvr>
+    <a:masterClrMapping/>
+  </p:clrMapOvr>
+</p:sld>
+</file>
+
+<file path=ppt/slides/slide22.xml><?xml version="1.0" encoding="utf-8"?>
+<p:sld xmlns:a="http://schemas.openxmlformats.org/drawingml/2006/main" xmlns:r="http://schemas.openxmlformats.org/officeDocument/2006/relationships" xmlns:p="http://schemas.openxmlformats.org/presentationml/2006/main">
+  <p:cSld>
+    <p:spTree>
+      <p:nvGrpSpPr>
+        <p:cNvPr id="1" name=""/>
+        <p:cNvGrpSpPr/>
+        <p:nvPr/>
+      </p:nvGrpSpPr>
+      <p:grpSpPr>
+        <a:xfrm>
+          <a:off x="0" y="0"/>
+          <a:ext cx="0" cy="0"/>
+          <a:chOff x="0" y="0"/>
+          <a:chExt cx="0" cy="0"/>
+        </a:xfrm>
+      </p:grpSpPr>
+      <p:sp>
+        <p:nvSpPr>
+          <p:cNvPr id="2" name="Title 1">
+            <a:extLst>
+              <a:ext uri="{FF2B5EF4-FFF2-40B4-BE49-F238E27FC236}">
+                <a16:creationId xmlns:a16="http://schemas.microsoft.com/office/drawing/2014/main" id="{13B19DB2-FA25-4E01-8956-7950D3469CEC}"/>
+              </a:ext>
+            </a:extLst>
+          </p:cNvPr>
+          <p:cNvSpPr>
+            <a:spLocks noGrp="1"/>
+          </p:cNvSpPr>
+          <p:nvPr>
+            <p:ph type="title"/>
+          </p:nvPr>
+        </p:nvSpPr>
+        <p:spPr/>
+        <p:txBody>
+          <a:bodyPr/>
+          <a:lstStyle/>
+          <a:p>
+            <a:endParaRPr lang="en-US"/>
+          </a:p>
+        </p:txBody>
+      </p:sp>
+      <p:sp>
+        <p:nvSpPr>
+          <p:cNvPr id="3" name="Content Placeholder 2">
+            <a:extLst>
+              <a:ext uri="{FF2B5EF4-FFF2-40B4-BE49-F238E27FC236}">
+                <a16:creationId xmlns:a16="http://schemas.microsoft.com/office/drawing/2014/main" id="{2948D628-66A6-4DDE-8FF7-D1B835A00151}"/>
+              </a:ext>
+            </a:extLst>
+          </p:cNvPr>
+          <p:cNvSpPr>
+            <a:spLocks noGrp="1"/>
+          </p:cNvSpPr>
+          <p:nvPr>
+            <p:ph idx="1"/>
+          </p:nvPr>
+        </p:nvSpPr>
+        <p:spPr/>
+        <p:txBody>
+          <a:bodyPr/>
+          <a:lstStyle/>
+          <a:p>
+            <a:endParaRPr lang="en-US"/>
+          </a:p>
+        </p:txBody>
+      </p:sp>
+      <p:pic>
+        <p:nvPicPr>
+          <p:cNvPr id="4098" name="Picture 2" descr="Image result for roc sensitivity specificity curve">
+            <a:extLst>
+              <a:ext uri="{FF2B5EF4-FFF2-40B4-BE49-F238E27FC236}">
+                <a16:creationId xmlns:a16="http://schemas.microsoft.com/office/drawing/2014/main" id="{373AD2E1-8C73-4445-8F13-66D9A2A9401B}"/>
+              </a:ext>
+            </a:extLst>
+          </p:cNvPr>
+          <p:cNvPicPr>
+            <a:picLocks noChangeAspect="1" noChangeArrowheads="1"/>
+          </p:cNvPicPr>
+          <p:nvPr/>
+        </p:nvPicPr>
+        <p:blipFill>
+          <a:blip r:embed="rId2">
+            <a:extLst>
+              <a:ext uri="{28A0092B-C50C-407E-A947-70E740481C1C}">
+                <a14:useLocalDpi xmlns:a14="http://schemas.microsoft.com/office/drawing/2010/main" val="0"/>
+              </a:ext>
+            </a:extLst>
+          </a:blip>
+          <a:srcRect/>
+          <a:stretch>
+            <a:fillRect/>
+          </a:stretch>
+        </p:blipFill>
+        <p:spPr bwMode="auto">
+          <a:xfrm>
+            <a:off x="3052763" y="1042988"/>
+            <a:ext cx="6086475" cy="4772025"/>
+          </a:xfrm>
+          <a:prstGeom prst="rect">
+            <a:avLst/>
+          </a:prstGeom>
+          <a:noFill/>
+          <a:extLst>
+            <a:ext uri="{909E8E84-426E-40DD-AFC4-6F175D3DCCD1}">
+              <a14:hiddenFill xmlns:a14="http://schemas.microsoft.com/office/drawing/2010/main">
+                <a:solidFill>
+                  <a:srgbClr val="FFFFFF"/>
+                </a:solidFill>
+              </a14:hiddenFill>
+            </a:ext>
+          </a:extLst>
+        </p:spPr>
+      </p:pic>
+    </p:spTree>
+    <p:extLst>
+      <p:ext uri="{BB962C8B-B14F-4D97-AF65-F5344CB8AC3E}">
+        <p14:creationId xmlns:p14="http://schemas.microsoft.com/office/powerpoint/2010/main" val="891504164"/>
       </p:ext>
     </p:extLst>
   </p:cSld>
@@ -5345,6 +7691,174 @@
   <p:clrMapOvr>
     <a:masterClrMapping/>
   </p:clrMapOvr>
+  <p:timing>
+    <p:tnLst>
+      <p:par>
+        <p:cTn id="1" dur="indefinite" restart="never" nodeType="tmRoot">
+          <p:childTnLst>
+            <p:seq concurrent="1" nextAc="seek">
+              <p:cTn id="2" dur="indefinite" nodeType="mainSeq">
+                <p:childTnLst>
+                  <p:par>
+                    <p:cTn id="3" fill="hold">
+                      <p:stCondLst>
+                        <p:cond delay="indefinite"/>
+                      </p:stCondLst>
+                      <p:childTnLst>
+                        <p:par>
+                          <p:cTn id="4" fill="hold">
+                            <p:stCondLst>
+                              <p:cond delay="0"/>
+                            </p:stCondLst>
+                            <p:childTnLst>
+                              <p:par>
+                                <p:cTn id="5" presetID="1" presetClass="entr" presetSubtype="0" fill="hold" nodeType="clickEffect">
+                                  <p:stCondLst>
+                                    <p:cond delay="0"/>
+                                  </p:stCondLst>
+                                  <p:childTnLst>
+                                    <p:set>
+                                      <p:cBhvr>
+                                        <p:cTn id="6" dur="1" fill="hold">
+                                          <p:stCondLst>
+                                            <p:cond delay="0"/>
+                                          </p:stCondLst>
+                                        </p:cTn>
+                                        <p:tgtEl>
+                                          <p:spTgt spid="3">
+                                            <p:txEl>
+                                              <p:pRg st="6" end="6"/>
+                                            </p:txEl>
+                                          </p:spTgt>
+                                        </p:tgtEl>
+                                        <p:attrNameLst>
+                                          <p:attrName>style.visibility</p:attrName>
+                                        </p:attrNameLst>
+                                      </p:cBhvr>
+                                      <p:to>
+                                        <p:strVal val="visible"/>
+                                      </p:to>
+                                    </p:set>
+                                  </p:childTnLst>
+                                </p:cTn>
+                              </p:par>
+                              <p:par>
+                                <p:cTn id="7" presetID="1" presetClass="entr" presetSubtype="0" fill="hold" nodeType="withEffect">
+                                  <p:stCondLst>
+                                    <p:cond delay="0"/>
+                                  </p:stCondLst>
+                                  <p:childTnLst>
+                                    <p:set>
+                                      <p:cBhvr>
+                                        <p:cTn id="8" dur="1" fill="hold">
+                                          <p:stCondLst>
+                                            <p:cond delay="0"/>
+                                          </p:stCondLst>
+                                        </p:cTn>
+                                        <p:tgtEl>
+                                          <p:spTgt spid="3">
+                                            <p:txEl>
+                                              <p:pRg st="7" end="7"/>
+                                            </p:txEl>
+                                          </p:spTgt>
+                                        </p:tgtEl>
+                                        <p:attrNameLst>
+                                          <p:attrName>style.visibility</p:attrName>
+                                        </p:attrNameLst>
+                                      </p:cBhvr>
+                                      <p:to>
+                                        <p:strVal val="visible"/>
+                                      </p:to>
+                                    </p:set>
+                                  </p:childTnLst>
+                                </p:cTn>
+                              </p:par>
+                              <p:par>
+                                <p:cTn id="9" presetID="1" presetClass="entr" presetSubtype="0" fill="hold" nodeType="withEffect">
+                                  <p:stCondLst>
+                                    <p:cond delay="0"/>
+                                  </p:stCondLst>
+                                  <p:childTnLst>
+                                    <p:set>
+                                      <p:cBhvr>
+                                        <p:cTn id="10" dur="1" fill="hold">
+                                          <p:stCondLst>
+                                            <p:cond delay="0"/>
+                                          </p:stCondLst>
+                                        </p:cTn>
+                                        <p:tgtEl>
+                                          <p:spTgt spid="3">
+                                            <p:txEl>
+                                              <p:pRg st="8" end="8"/>
+                                            </p:txEl>
+                                          </p:spTgt>
+                                        </p:tgtEl>
+                                        <p:attrNameLst>
+                                          <p:attrName>style.visibility</p:attrName>
+                                        </p:attrNameLst>
+                                      </p:cBhvr>
+                                      <p:to>
+                                        <p:strVal val="visible"/>
+                                      </p:to>
+                                    </p:set>
+                                  </p:childTnLst>
+                                </p:cTn>
+                              </p:par>
+                              <p:par>
+                                <p:cTn id="11" presetID="1" presetClass="entr" presetSubtype="0" fill="hold" nodeType="withEffect">
+                                  <p:stCondLst>
+                                    <p:cond delay="0"/>
+                                  </p:stCondLst>
+                                  <p:childTnLst>
+                                    <p:set>
+                                      <p:cBhvr>
+                                        <p:cTn id="12" dur="1" fill="hold">
+                                          <p:stCondLst>
+                                            <p:cond delay="0"/>
+                                          </p:stCondLst>
+                                        </p:cTn>
+                                        <p:tgtEl>
+                                          <p:spTgt spid="2052"/>
+                                        </p:tgtEl>
+                                        <p:attrNameLst>
+                                          <p:attrName>style.visibility</p:attrName>
+                                        </p:attrNameLst>
+                                      </p:cBhvr>
+                                      <p:to>
+                                        <p:strVal val="visible"/>
+                                      </p:to>
+                                    </p:set>
+                                  </p:childTnLst>
+                                </p:cTn>
+                              </p:par>
+                            </p:childTnLst>
+                          </p:cTn>
+                        </p:par>
+                      </p:childTnLst>
+                    </p:cTn>
+                  </p:par>
+                </p:childTnLst>
+              </p:cTn>
+              <p:prevCondLst>
+                <p:cond evt="onPrev" delay="0">
+                  <p:tgtEl>
+                    <p:sldTgt/>
+                  </p:tgtEl>
+                </p:cond>
+              </p:prevCondLst>
+              <p:nextCondLst>
+                <p:cond evt="onNext" delay="0">
+                  <p:tgtEl>
+                    <p:sldTgt/>
+                  </p:tgtEl>
+                </p:cond>
+              </p:nextCondLst>
+            </p:seq>
+          </p:childTnLst>
+        </p:cTn>
+      </p:par>
+    </p:tnLst>
+  </p:timing>
 </p:sld>
 </file>
 
@@ -5430,35 +7944,26 @@
           <a:p>
             <a:r>
               <a:rPr lang="en-US" dirty="0"/>
-              <a:t>Basic ML tasks</a:t>
-            </a:r>
-          </a:p>
-          <a:p>
-            <a:pPr lvl="1"/>
+              <a:t>Model generalization</a:t>
+            </a:r>
+          </a:p>
+          <a:p>
             <a:r>
               <a:rPr lang="en-US" dirty="0"/>
-              <a:t>Classification</a:t>
-            </a:r>
-          </a:p>
-          <a:p>
-            <a:pPr lvl="1"/>
+              <a:t>Error metrics</a:t>
+            </a:r>
+          </a:p>
+          <a:p>
             <a:r>
               <a:rPr lang="en-US" dirty="0"/>
-              <a:t>Regression </a:t>
-            </a:r>
-          </a:p>
-          <a:p>
-            <a:r>
-              <a:rPr lang="en-US" dirty="0" err="1"/>
-              <a:t>scikit</a:t>
-            </a:r>
+              <a:t>Cross-validation</a:t>
+            </a:r>
+          </a:p>
+          <a:p>
             <a:r>
               <a:rPr lang="en-US" dirty="0"/>
-              <a:t>-learn</a:t>
-            </a:r>
-          </a:p>
-          <a:p>
-            <a:endParaRPr lang="en-US" dirty="0"/>
+              <a:t>Regularization</a:t>
+            </a:r>
           </a:p>
         </p:txBody>
       </p:sp>
@@ -5497,7 +8002,7 @@
           <p:cNvPr id="2" name="Title 1">
             <a:extLst>
               <a:ext uri="{FF2B5EF4-FFF2-40B4-BE49-F238E27FC236}">
-                <a16:creationId xmlns:a16="http://schemas.microsoft.com/office/drawing/2014/main" id="{032591F4-7FD9-4F39-B819-DC0DE4C1BE08}"/>
+                <a16:creationId xmlns:a16="http://schemas.microsoft.com/office/drawing/2014/main" id="{7D85B78E-AC34-4AAB-81C2-563A4A2D8C8F}"/>
               </a:ext>
             </a:extLst>
           </p:cNvPr>
@@ -5515,7 +8020,7 @@
           <a:p>
             <a:r>
               <a:rPr lang="en-US" dirty="0"/>
-              <a:t>Deep learning is only one of many ML algorithms</a:t>
+              <a:t>Mathematical models</a:t>
             </a:r>
           </a:p>
         </p:txBody>
@@ -5525,7 +8030,7 @@
           <p:cNvPr id="3" name="Content Placeholder 2">
             <a:extLst>
               <a:ext uri="{FF2B5EF4-FFF2-40B4-BE49-F238E27FC236}">
-                <a16:creationId xmlns:a16="http://schemas.microsoft.com/office/drawing/2014/main" id="{210EEA77-3265-49FC-9AEC-FC11B5289809}"/>
+                <a16:creationId xmlns:a16="http://schemas.microsoft.com/office/drawing/2014/main" id="{3F25C6E3-7EC3-43D8-8374-792AD5F1980F}"/>
               </a:ext>
             </a:extLst>
           </p:cNvPr>
@@ -5541,170 +8046,29 @@
           <a:bodyPr/>
           <a:lstStyle/>
           <a:p>
-            <a:endParaRPr lang="en-US"/>
-          </a:p>
-        </p:txBody>
-      </p:sp>
-      <p:pic>
-        <p:nvPicPr>
-          <p:cNvPr id="1026" name="Picture 2" descr="https://5.imimg.com/data5/JT/WK/MY-19210072/tool-box-500x500.jpg">
-            <a:extLst>
-              <a:ext uri="{FF2B5EF4-FFF2-40B4-BE49-F238E27FC236}">
-                <a16:creationId xmlns:a16="http://schemas.microsoft.com/office/drawing/2014/main" id="{0F5FA603-784E-4172-8FA1-A5FF926C2A94}"/>
-              </a:ext>
-            </a:extLst>
-          </p:cNvPr>
-          <p:cNvPicPr>
-            <a:picLocks noChangeAspect="1" noChangeArrowheads="1"/>
-          </p:cNvPicPr>
-          <p:nvPr/>
-        </p:nvPicPr>
-        <p:blipFill>
-          <a:blip r:embed="rId2">
-            <a:extLst>
-              <a:ext uri="{28A0092B-C50C-407E-A947-70E740481C1C}">
-                <a14:useLocalDpi xmlns:a14="http://schemas.microsoft.com/office/drawing/2010/main" val="0"/>
-              </a:ext>
-            </a:extLst>
-          </a:blip>
-          <a:srcRect/>
-          <a:stretch>
-            <a:fillRect/>
-          </a:stretch>
-        </p:blipFill>
-        <p:spPr bwMode="auto">
-          <a:xfrm>
-            <a:off x="6591300" y="1349086"/>
-            <a:ext cx="4762500" cy="4762500"/>
-          </a:xfrm>
-          <a:prstGeom prst="rect">
-            <a:avLst/>
-          </a:prstGeom>
-          <a:noFill/>
-          <a:extLst>
-            <a:ext uri="{909E8E84-426E-40DD-AFC4-6F175D3DCCD1}">
-              <a14:hiddenFill xmlns:a14="http://schemas.microsoft.com/office/drawing/2010/main">
-                <a:solidFill>
-                  <a:srgbClr val="FFFFFF"/>
-                </a:solidFill>
-              </a14:hiddenFill>
-            </a:ext>
-          </a:extLst>
-        </p:spPr>
-      </p:pic>
-      <p:pic>
-        <p:nvPicPr>
-          <p:cNvPr id="1030" name="Picture 6" descr="Image result for sledge hammer">
-            <a:extLst>
-              <a:ext uri="{FF2B5EF4-FFF2-40B4-BE49-F238E27FC236}">
-                <a16:creationId xmlns:a16="http://schemas.microsoft.com/office/drawing/2014/main" id="{55B718D2-1B01-4E06-85F0-EE100D8987D9}"/>
-              </a:ext>
-            </a:extLst>
-          </p:cNvPr>
-          <p:cNvPicPr>
-            <a:picLocks noChangeAspect="1" noChangeArrowheads="1"/>
-          </p:cNvPicPr>
-          <p:nvPr/>
-        </p:nvPicPr>
-        <p:blipFill>
-          <a:blip r:embed="rId3">
-            <a:extLst>
-              <a:ext uri="{28A0092B-C50C-407E-A947-70E740481C1C}">
-                <a14:useLocalDpi xmlns:a14="http://schemas.microsoft.com/office/drawing/2010/main" val="0"/>
-              </a:ext>
-            </a:extLst>
-          </a:blip>
-          <a:srcRect/>
-          <a:stretch>
-            <a:fillRect/>
-          </a:stretch>
-        </p:blipFill>
-        <p:spPr bwMode="auto">
-          <a:xfrm>
-            <a:off x="1794163" y="2092037"/>
-            <a:ext cx="3124199" cy="3124199"/>
-          </a:xfrm>
-          <a:prstGeom prst="rect">
-            <a:avLst/>
-          </a:prstGeom>
-          <a:noFill/>
-          <a:extLst>
-            <a:ext uri="{909E8E84-426E-40DD-AFC4-6F175D3DCCD1}">
-              <a14:hiddenFill xmlns:a14="http://schemas.microsoft.com/office/drawing/2010/main">
-                <a:solidFill>
-                  <a:srgbClr val="FFFFFF"/>
-                </a:solidFill>
-              </a14:hiddenFill>
-            </a:ext>
-          </a:extLst>
-        </p:spPr>
-      </p:pic>
-      <p:sp>
-        <p:nvSpPr>
-          <p:cNvPr id="4" name="TextBox 3">
-            <a:extLst>
-              <a:ext uri="{FF2B5EF4-FFF2-40B4-BE49-F238E27FC236}">
-                <a16:creationId xmlns:a16="http://schemas.microsoft.com/office/drawing/2014/main" id="{BA8A540C-B48C-434E-A630-7C8EBE40D014}"/>
-              </a:ext>
-            </a:extLst>
-          </p:cNvPr>
-          <p:cNvSpPr txBox="1"/>
-          <p:nvPr/>
-        </p:nvSpPr>
-        <p:spPr>
-          <a:xfrm>
-            <a:off x="2060074" y="5652655"/>
-            <a:ext cx="2592376" cy="584775"/>
-          </a:xfrm>
-          <a:prstGeom prst="rect">
-            <a:avLst/>
-          </a:prstGeom>
-          <a:noFill/>
-        </p:spPr>
-        <p:txBody>
-          <a:bodyPr wrap="none" rtlCol="0">
-            <a:spAutoFit/>
-          </a:bodyPr>
-          <a:lstStyle/>
-          <a:p>
-            <a:r>
-              <a:rPr lang="en-US" sz="3200" dirty="0"/>
-              <a:t>Deep Learning</a:t>
-            </a:r>
-          </a:p>
-        </p:txBody>
-      </p:sp>
-      <p:sp>
-        <p:nvSpPr>
-          <p:cNvPr id="8" name="TextBox 7">
-            <a:extLst>
-              <a:ext uri="{FF2B5EF4-FFF2-40B4-BE49-F238E27FC236}">
-                <a16:creationId xmlns:a16="http://schemas.microsoft.com/office/drawing/2014/main" id="{CDCBE9E2-73F9-4031-984F-0448F460EEEC}"/>
-              </a:ext>
-            </a:extLst>
-          </p:cNvPr>
-          <p:cNvSpPr txBox="1"/>
-          <p:nvPr/>
-        </p:nvSpPr>
-        <p:spPr>
-          <a:xfrm>
-            <a:off x="7237695" y="5640967"/>
-            <a:ext cx="3167855" cy="584775"/>
-          </a:xfrm>
-          <a:prstGeom prst="rect">
-            <a:avLst/>
-          </a:prstGeom>
-          <a:noFill/>
-        </p:spPr>
-        <p:txBody>
-          <a:bodyPr wrap="none" rtlCol="0">
-            <a:spAutoFit/>
-          </a:bodyPr>
-          <a:lstStyle/>
-          <a:p>
-            <a:r>
-              <a:rPr lang="en-US" sz="3200" dirty="0"/>
-              <a:t>Machine Learning</a:t>
+            <a:r>
+              <a:rPr lang="en-US" dirty="0"/>
+              <a:t>Equations that attempt to explain observed data</a:t>
+            </a:r>
+          </a:p>
+          <a:p>
+            <a:r>
+              <a:rPr lang="en-US" dirty="0"/>
+              <a:t>Two general types</a:t>
+            </a:r>
+          </a:p>
+          <a:p>
+            <a:pPr lvl="1"/>
+            <a:r>
+              <a:rPr lang="en-US" dirty="0"/>
+              <a:t>Linear</a:t>
+            </a:r>
+          </a:p>
+          <a:p>
+            <a:pPr lvl="1"/>
+            <a:r>
+              <a:rPr lang="en-US" dirty="0"/>
+              <a:t>Non-linear</a:t>
             </a:r>
           </a:p>
         </p:txBody>
@@ -5712,7 +8076,7 @@
     </p:spTree>
     <p:extLst>
       <p:ext uri="{BB962C8B-B14F-4D97-AF65-F5344CB8AC3E}">
-        <p14:creationId xmlns:p14="http://schemas.microsoft.com/office/powerpoint/2010/main" val="3848275492"/>
+        <p14:creationId xmlns:p14="http://schemas.microsoft.com/office/powerpoint/2010/main" val="2767806745"/>
       </p:ext>
     </p:extLst>
   </p:cSld>
@@ -5741,10 +8105,10 @@
       </p:grpSpPr>
       <p:sp>
         <p:nvSpPr>
-          <p:cNvPr id="2" name="Title 1">
-            <a:extLst>
-              <a:ext uri="{FF2B5EF4-FFF2-40B4-BE49-F238E27FC236}">
-                <a16:creationId xmlns:a16="http://schemas.microsoft.com/office/drawing/2014/main" id="{75F4DECD-668D-4954-B68B-552BC30D520B}"/>
+          <p:cNvPr id="4" name="Title 3">
+            <a:extLst>
+              <a:ext uri="{FF2B5EF4-FFF2-40B4-BE49-F238E27FC236}">
+                <a16:creationId xmlns:a16="http://schemas.microsoft.com/office/drawing/2014/main" id="{2316DA69-4E9B-42EA-A241-77C2C6B14D4E}"/>
               </a:ext>
             </a:extLst>
           </p:cNvPr>
@@ -5762,25 +8126,25 @@
           <a:p>
             <a:r>
               <a:rPr lang="en-US" dirty="0"/>
-              <a:t>Regression Examples</a:t>
-            </a:r>
-          </a:p>
-        </p:txBody>
-      </p:sp>
-      <p:sp>
-        <p:nvSpPr>
-          <p:cNvPr id="3" name="Content Placeholder 2">
-            <a:extLst>
-              <a:ext uri="{FF2B5EF4-FFF2-40B4-BE49-F238E27FC236}">
-                <a16:creationId xmlns:a16="http://schemas.microsoft.com/office/drawing/2014/main" id="{DC1CA635-C16E-4BDF-B61A-003680E3FF85}"/>
-              </a:ext>
-            </a:extLst>
-          </p:cNvPr>
-          <p:cNvSpPr>
-            <a:spLocks noGrp="1"/>
-          </p:cNvSpPr>
-          <p:nvPr>
-            <p:ph idx="1"/>
+              <a:t>Model generalization</a:t>
+            </a:r>
+          </a:p>
+        </p:txBody>
+      </p:sp>
+      <p:sp>
+        <p:nvSpPr>
+          <p:cNvPr id="5" name="Text Placeholder 4">
+            <a:extLst>
+              <a:ext uri="{FF2B5EF4-FFF2-40B4-BE49-F238E27FC236}">
+                <a16:creationId xmlns:a16="http://schemas.microsoft.com/office/drawing/2014/main" id="{4CA98909-FF47-4637-8AC7-3BCBA9A6B266}"/>
+              </a:ext>
+            </a:extLst>
+          </p:cNvPr>
+          <p:cNvSpPr>
+            <a:spLocks noGrp="1"/>
+          </p:cNvSpPr>
+          <p:nvPr>
+            <p:ph type="body" idx="1"/>
           </p:nvPr>
         </p:nvSpPr>
         <p:spPr/>
@@ -5790,53 +8154,15 @@
           <a:p>
             <a:r>
               <a:rPr lang="en-US" dirty="0"/>
-              <a:t>Predict housing prices</a:t>
-            </a:r>
-          </a:p>
-          <a:p>
-            <a:pPr lvl="1"/>
-            <a:r>
-              <a:rPr lang="en-US" dirty="0"/>
-              <a:t>Inputs: number of rooms, number of bathrooms sq. meters</a:t>
-            </a:r>
-          </a:p>
-          <a:p>
-            <a:pPr lvl="1"/>
-            <a:r>
-              <a:rPr lang="en-US" dirty="0"/>
-              <a:t>Output: price</a:t>
-            </a:r>
-          </a:p>
-          <a:p>
-            <a:r>
-              <a:rPr lang="en-US" dirty="0"/>
-              <a:t>Predict lifespan</a:t>
-            </a:r>
-          </a:p>
-          <a:p>
-            <a:pPr lvl="1"/>
-            <a:r>
-              <a:rPr lang="en-US" dirty="0"/>
-              <a:t>Inputs: number of hours exercise per week, smoker,  country, great grand parents’ age</a:t>
-            </a:r>
-          </a:p>
-          <a:p>
-            <a:pPr lvl="1"/>
-            <a:r>
-              <a:rPr lang="en-US" dirty="0"/>
-              <a:t>Output: age</a:t>
-            </a:r>
-          </a:p>
-          <a:p>
-            <a:pPr lvl="1"/>
-            <a:endParaRPr lang="en-US" dirty="0"/>
+              <a:t>How well does model work with new data</a:t>
+            </a:r>
           </a:p>
         </p:txBody>
       </p:sp>
     </p:spTree>
     <p:extLst>
       <p:ext uri="{BB962C8B-B14F-4D97-AF65-F5344CB8AC3E}">
-        <p14:creationId xmlns:p14="http://schemas.microsoft.com/office/powerpoint/2010/main" val="856700196"/>
+        <p14:creationId xmlns:p14="http://schemas.microsoft.com/office/powerpoint/2010/main" val="4170970859"/>
       </p:ext>
     </p:extLst>
   </p:cSld>
@@ -5868,7 +8194,7 @@
           <p:cNvPr id="2" name="Title 1">
             <a:extLst>
               <a:ext uri="{FF2B5EF4-FFF2-40B4-BE49-F238E27FC236}">
-                <a16:creationId xmlns:a16="http://schemas.microsoft.com/office/drawing/2014/main" id="{6AF747BF-CA00-42F6-B6D4-13061A37EDDA}"/>
+                <a16:creationId xmlns:a16="http://schemas.microsoft.com/office/drawing/2014/main" id="{DFCA7659-1AA6-4A10-B14A-DBF738046C67}"/>
               </a:ext>
             </a:extLst>
           </p:cNvPr>
@@ -5886,205 +8212,15 @@
           <a:p>
             <a:r>
               <a:rPr lang="en-US" dirty="0"/>
-              <a:t>Regression training</a:t>
-            </a:r>
-          </a:p>
-        </p:txBody>
-      </p:sp>
-      <mc:AlternateContent xmlns:mc="http://schemas.openxmlformats.org/markup-compatibility/2006" xmlns:a14="http://schemas.microsoft.com/office/drawing/2010/main">
-        <mc:Choice Requires="a14">
-          <p:sp>
-            <p:nvSpPr>
-              <p:cNvPr id="3" name="Content Placeholder 2">
-                <a:extLst>
-                  <a:ext uri="{FF2B5EF4-FFF2-40B4-BE49-F238E27FC236}">
-                    <a16:creationId xmlns:a16="http://schemas.microsoft.com/office/drawing/2014/main" id="{1B35E2AB-06CC-4EE3-B251-4A320B1EA697}"/>
-                  </a:ext>
-                </a:extLst>
-              </p:cNvPr>
-              <p:cNvSpPr>
-                <a:spLocks noGrp="1"/>
-              </p:cNvSpPr>
-              <p:nvPr>
-                <p:ph idx="1"/>
-              </p:nvPr>
-            </p:nvSpPr>
-            <p:spPr>
-              <a:xfrm>
-                <a:off x="838200" y="1825625"/>
-                <a:ext cx="10515600" cy="4351338"/>
-              </a:xfrm>
-            </p:spPr>
-            <p:txBody>
-              <a:bodyPr/>
-              <a:lstStyle/>
-              <a:p>
-                <a:r>
-                  <a:rPr lang="en-US" dirty="0"/>
-                  <a:t>Collect data</a:t>
-                </a:r>
-              </a:p>
-              <a:p>
-                <a:pPr lvl="1"/>
-                <a:r>
-                  <a:rPr lang="en-US" dirty="0"/>
-                  <a:t>input/output pairs</a:t>
-                </a:r>
-              </a:p>
-              <a:p>
-                <a:r>
-                  <a:rPr lang="en-US" dirty="0"/>
-                  <a:t>Analyze data</a:t>
-                </a:r>
-              </a:p>
-              <a:p>
-                <a:pPr lvl="1"/>
-                <a:r>
-                  <a:rPr lang="en-US" dirty="0"/>
-                  <a:t>Is the relationship linear or nonlinear?</a:t>
-                </a:r>
-              </a:p>
-              <a:p>
-                <a:pPr lvl="1"/>
-                <a:r>
-                  <a:rPr lang="en-US" dirty="0"/>
-                  <a:t>More difficult to analyze when </a:t>
-                </a:r>
-                <a14:m>
-                  <m:oMath xmlns:m="http://schemas.openxmlformats.org/officeDocument/2006/math">
-                    <m:r>
-                      <a:rPr lang="en-US" b="0" i="1" smtClean="0">
-                        <a:latin typeface="Cambria Math" panose="02040503050406030204" pitchFamily="18" charset="0"/>
-                      </a:rPr>
-                      <m:t>𝑋</m:t>
-                    </m:r>
-                  </m:oMath>
-                </a14:m>
-                <a:r>
-                  <a:rPr lang="en-US" dirty="0"/>
-                  <a:t> is large,</a:t>
-                </a:r>
-              </a:p>
-              <a:p>
-                <a:pPr marL="457200" lvl="1" indent="0">
-                  <a:buNone/>
-                </a:pPr>
-                <a:r>
-                  <a:rPr lang="en-US" dirty="0"/>
-                  <a:t>   e.g. a tensor</a:t>
-                </a:r>
-              </a:p>
-              <a:p>
-                <a:r>
-                  <a:rPr lang="en-US" dirty="0"/>
-                  <a:t>Choose model for the task</a:t>
-                </a:r>
-              </a:p>
-              <a:p>
-                <a:pPr lvl="1"/>
-                <a:r>
-                  <a:rPr lang="en-US" dirty="0"/>
-                  <a:t>Linear, nonlinear</a:t>
-                </a:r>
-              </a:p>
-            </p:txBody>
-          </p:sp>
-        </mc:Choice>
-        <mc:Fallback xmlns="">
-          <p:sp>
-            <p:nvSpPr>
-              <p:cNvPr id="3" name="Content Placeholder 2">
-                <a:extLst>
-                  <a:ext uri="{FF2B5EF4-FFF2-40B4-BE49-F238E27FC236}">
-                    <a16:creationId xmlns:a16="http://schemas.microsoft.com/office/drawing/2014/main" id="{1B35E2AB-06CC-4EE3-B251-4A320B1EA697}"/>
-                  </a:ext>
-                </a:extLst>
-              </p:cNvPr>
-              <p:cNvSpPr>
-                <a:spLocks noGrp="1" noRot="1" noChangeAspect="1" noMove="1" noResize="1" noEditPoints="1" noAdjustHandles="1" noChangeArrowheads="1" noChangeShapeType="1" noTextEdit="1"/>
-              </p:cNvSpPr>
-              <p:nvPr>
-                <p:ph idx="1"/>
-              </p:nvPr>
-            </p:nvSpPr>
-            <p:spPr>
-              <a:xfrm>
-                <a:off x="838200" y="1825625"/>
-                <a:ext cx="10515600" cy="4351338"/>
-              </a:xfrm>
-              <a:blipFill>
-                <a:blip r:embed="rId2"/>
-                <a:stretch>
-                  <a:fillRect l="-1043" t="-2241"/>
-                </a:stretch>
-              </a:blipFill>
-            </p:spPr>
-            <p:txBody>
-              <a:bodyPr/>
-              <a:lstStyle/>
-              <a:p>
-                <a:r>
-                  <a:rPr lang="en-US">
-                    <a:noFill/>
-                  </a:rPr>
-                  <a:t> </a:t>
-                </a:r>
-              </a:p>
-            </p:txBody>
-          </p:sp>
-        </mc:Fallback>
-      </mc:AlternateContent>
-      <p:pic>
-        <p:nvPicPr>
-          <p:cNvPr id="3074" name="Picture 2" descr="Image result for nonlinear regression">
-            <a:extLst>
-              <a:ext uri="{FF2B5EF4-FFF2-40B4-BE49-F238E27FC236}">
-                <a16:creationId xmlns:a16="http://schemas.microsoft.com/office/drawing/2014/main" id="{838A07F3-14B5-4A28-9F1C-3E9D8763332F}"/>
-              </a:ext>
-            </a:extLst>
-          </p:cNvPr>
-          <p:cNvPicPr>
-            <a:picLocks noChangeAspect="1" noChangeArrowheads="1"/>
-          </p:cNvPicPr>
-          <p:nvPr/>
-        </p:nvPicPr>
-        <p:blipFill>
-          <a:blip r:embed="rId3">
-            <a:extLst>
-              <a:ext uri="{28A0092B-C50C-407E-A947-70E740481C1C}">
-                <a14:useLocalDpi xmlns:a14="http://schemas.microsoft.com/office/drawing/2010/main" val="0"/>
-              </a:ext>
-            </a:extLst>
-          </a:blip>
-          <a:srcRect/>
-          <a:stretch>
-            <a:fillRect/>
-          </a:stretch>
-        </p:blipFill>
-        <p:spPr bwMode="auto">
-          <a:xfrm>
-            <a:off x="7859220" y="1163573"/>
-            <a:ext cx="3810000" cy="3810000"/>
-          </a:xfrm>
-          <a:prstGeom prst="rect">
-            <a:avLst/>
-          </a:prstGeom>
-          <a:noFill/>
-          <a:extLst>
-            <a:ext uri="{909E8E84-426E-40DD-AFC4-6F175D3DCCD1}">
-              <a14:hiddenFill xmlns:a14="http://schemas.microsoft.com/office/drawing/2010/main">
-                <a:solidFill>
-                  <a:srgbClr val="FFFFFF"/>
-                </a:solidFill>
-              </a14:hiddenFill>
-            </a:ext>
-          </a:extLst>
-        </p:spPr>
-      </p:pic>
+              <a:t>Underfitting and overfitting (regression)</a:t>
+            </a:r>
+          </a:p>
+        </p:txBody>
+      </p:sp>
     </p:spTree>
     <p:extLst>
       <p:ext uri="{BB962C8B-B14F-4D97-AF65-F5344CB8AC3E}">
-        <p14:creationId xmlns:p14="http://schemas.microsoft.com/office/powerpoint/2010/main" val="4091076455"/>
+        <p14:creationId xmlns:p14="http://schemas.microsoft.com/office/powerpoint/2010/main" val="2498748716"/>
       </p:ext>
     </p:extLst>
   </p:cSld>
@@ -6116,7 +8252,7 @@
           <p:cNvPr id="2" name="Title 1">
             <a:extLst>
               <a:ext uri="{FF2B5EF4-FFF2-40B4-BE49-F238E27FC236}">
-                <a16:creationId xmlns:a16="http://schemas.microsoft.com/office/drawing/2014/main" id="{45655251-B8E5-4B4D-82DE-183D4176FD9A}"/>
+                <a16:creationId xmlns:a16="http://schemas.microsoft.com/office/drawing/2014/main" id="{908606A5-B4A5-48CD-AFDC-3A40E6DAE367}"/>
               </a:ext>
             </a:extLst>
           </p:cNvPr>
@@ -6134,143 +8270,7 @@
           <a:p>
             <a:r>
               <a:rPr lang="en-US" dirty="0"/>
-              <a:t>Classification Examples</a:t>
-            </a:r>
-          </a:p>
-        </p:txBody>
-      </p:sp>
-      <p:sp>
-        <p:nvSpPr>
-          <p:cNvPr id="3" name="Content Placeholder 2">
-            <a:extLst>
-              <a:ext uri="{FF2B5EF4-FFF2-40B4-BE49-F238E27FC236}">
-                <a16:creationId xmlns:a16="http://schemas.microsoft.com/office/drawing/2014/main" id="{955549FC-3939-488E-B8A6-0B3B6B49A0B0}"/>
-              </a:ext>
-            </a:extLst>
-          </p:cNvPr>
-          <p:cNvSpPr>
-            <a:spLocks noGrp="1"/>
-          </p:cNvSpPr>
-          <p:nvPr>
-            <p:ph idx="1"/>
-          </p:nvPr>
-        </p:nvSpPr>
-        <p:spPr>
-          <a:xfrm>
-            <a:off x="838200" y="1520825"/>
-            <a:ext cx="10515600" cy="4351338"/>
-          </a:xfrm>
-        </p:spPr>
-        <p:txBody>
-          <a:bodyPr/>
-          <a:lstStyle/>
-          <a:p>
-            <a:r>
-              <a:rPr lang="en-US" dirty="0"/>
-              <a:t>Predict if house in high or low crime area</a:t>
-            </a:r>
-          </a:p>
-          <a:p>
-            <a:r>
-              <a:rPr lang="en-US" dirty="0"/>
-              <a:t>Predict student future occupation</a:t>
-            </a:r>
-          </a:p>
-          <a:p>
-            <a:r>
-              <a:rPr lang="en-US" dirty="0"/>
-              <a:t>Given an x-ray, diagnose type of condition</a:t>
-            </a:r>
-          </a:p>
-          <a:p>
-            <a:r>
-              <a:rPr lang="en-US" dirty="0"/>
-              <a:t>Segment medical image according to tissue type </a:t>
-            </a:r>
-          </a:p>
-          <a:p>
-            <a:endParaRPr lang="en-US" dirty="0"/>
-          </a:p>
-        </p:txBody>
-      </p:sp>
-      <p:pic>
-        <p:nvPicPr>
-          <p:cNvPr id="1026" name="Picture 2" descr="http://niftyweb.cs.ucl.ac.uk/img/gif.png">
-            <a:extLst>
-              <a:ext uri="{FF2B5EF4-FFF2-40B4-BE49-F238E27FC236}">
-                <a16:creationId xmlns:a16="http://schemas.microsoft.com/office/drawing/2014/main" id="{3B48F7DA-FF96-4D1C-8C18-76D1A8B38056}"/>
-              </a:ext>
-            </a:extLst>
-          </p:cNvPr>
-          <p:cNvPicPr>
-            <a:picLocks noChangeAspect="1" noChangeArrowheads="1"/>
-          </p:cNvPicPr>
-          <p:nvPr/>
-        </p:nvPicPr>
-        <p:blipFill>
-          <a:blip r:embed="rId2">
-            <a:extLst>
-              <a:ext uri="{28A0092B-C50C-407E-A947-70E740481C1C}">
-                <a14:useLocalDpi xmlns:a14="http://schemas.microsoft.com/office/drawing/2010/main" val="0"/>
-              </a:ext>
-            </a:extLst>
-          </a:blip>
-          <a:srcRect/>
-          <a:stretch>
-            <a:fillRect/>
-          </a:stretch>
-        </p:blipFill>
-        <p:spPr bwMode="auto">
-          <a:xfrm>
-            <a:off x="3690850" y="3746371"/>
-            <a:ext cx="4575147" cy="2576875"/>
-          </a:xfrm>
-          <a:prstGeom prst="rect">
-            <a:avLst/>
-          </a:prstGeom>
-          <a:noFill/>
-          <a:extLst>
-            <a:ext uri="{909E8E84-426E-40DD-AFC4-6F175D3DCCD1}">
-              <a14:hiddenFill xmlns:a14="http://schemas.microsoft.com/office/drawing/2010/main">
-                <a:solidFill>
-                  <a:srgbClr val="FFFFFF"/>
-                </a:solidFill>
-              </a14:hiddenFill>
-            </a:ext>
-          </a:extLst>
-        </p:spPr>
-      </p:pic>
-      <p:sp>
-        <p:nvSpPr>
-          <p:cNvPr id="4" name="TextBox 3">
-            <a:extLst>
-              <a:ext uri="{FF2B5EF4-FFF2-40B4-BE49-F238E27FC236}">
-                <a16:creationId xmlns:a16="http://schemas.microsoft.com/office/drawing/2014/main" id="{1B6F912D-AE28-453F-A449-5C36A7215288}"/>
-              </a:ext>
-            </a:extLst>
-          </p:cNvPr>
-          <p:cNvSpPr txBox="1"/>
-          <p:nvPr/>
-        </p:nvSpPr>
-        <p:spPr>
-          <a:xfrm>
-            <a:off x="0" y="6611779"/>
-            <a:ext cx="2385589" cy="246221"/>
-          </a:xfrm>
-          <a:prstGeom prst="rect">
-            <a:avLst/>
-          </a:prstGeom>
-          <a:noFill/>
-        </p:spPr>
-        <p:txBody>
-          <a:bodyPr wrap="none" rtlCol="0">
-            <a:spAutoFit/>
-          </a:bodyPr>
-          <a:lstStyle/>
-          <a:p>
-            <a:r>
-              <a:rPr lang="en-US" sz="1000" dirty="0"/>
-              <a:t>Image credit: http://niftyweb.cs.ucl.ac.uk/</a:t>
+              <a:t>Underfitting and overfitting (classification)</a:t>
             </a:r>
           </a:p>
         </p:txBody>
@@ -6278,7 +8278,7 @@
     </p:spTree>
     <p:extLst>
       <p:ext uri="{BB962C8B-B14F-4D97-AF65-F5344CB8AC3E}">
-        <p14:creationId xmlns:p14="http://schemas.microsoft.com/office/powerpoint/2010/main" val="2997529684"/>
+        <p14:creationId xmlns:p14="http://schemas.microsoft.com/office/powerpoint/2010/main" val="1176532693"/>
       </p:ext>
     </p:extLst>
   </p:cSld>
@@ -6307,10 +8307,10 @@
       </p:grpSpPr>
       <p:sp>
         <p:nvSpPr>
-          <p:cNvPr id="2" name="Title 1">
-            <a:extLst>
-              <a:ext uri="{FF2B5EF4-FFF2-40B4-BE49-F238E27FC236}">
-                <a16:creationId xmlns:a16="http://schemas.microsoft.com/office/drawing/2014/main" id="{6AF747BF-CA00-42F6-B6D4-13061A37EDDA}"/>
+          <p:cNvPr id="4" name="Title 3">
+            <a:extLst>
+              <a:ext uri="{FF2B5EF4-FFF2-40B4-BE49-F238E27FC236}">
+                <a16:creationId xmlns:a16="http://schemas.microsoft.com/office/drawing/2014/main" id="{132AE5C0-82D9-42E3-92C6-A55FFF8F049F}"/>
               </a:ext>
             </a:extLst>
           </p:cNvPr>
@@ -6328,205 +8328,43 @@
           <a:p>
             <a:r>
               <a:rPr lang="en-US" dirty="0"/>
-              <a:t>Classifier training</a:t>
-            </a:r>
-          </a:p>
-        </p:txBody>
-      </p:sp>
-      <mc:AlternateContent xmlns:mc="http://schemas.openxmlformats.org/markup-compatibility/2006" xmlns:a14="http://schemas.microsoft.com/office/drawing/2010/main">
-        <mc:Choice Requires="a14">
-          <p:sp>
-            <p:nvSpPr>
-              <p:cNvPr id="3" name="Content Placeholder 2">
-                <a:extLst>
-                  <a:ext uri="{FF2B5EF4-FFF2-40B4-BE49-F238E27FC236}">
-                    <a16:creationId xmlns:a16="http://schemas.microsoft.com/office/drawing/2014/main" id="{1B35E2AB-06CC-4EE3-B251-4A320B1EA697}"/>
-                  </a:ext>
-                </a:extLst>
-              </p:cNvPr>
-              <p:cNvSpPr>
-                <a:spLocks noGrp="1"/>
-              </p:cNvSpPr>
-              <p:nvPr>
-                <p:ph idx="1"/>
-              </p:nvPr>
-            </p:nvSpPr>
-            <p:spPr>
-              <a:xfrm>
-                <a:off x="838200" y="1825625"/>
-                <a:ext cx="10515600" cy="4351338"/>
-              </a:xfrm>
-            </p:spPr>
-            <p:txBody>
-              <a:bodyPr/>
-              <a:lstStyle/>
-              <a:p>
-                <a:r>
-                  <a:rPr lang="en-US" dirty="0"/>
-                  <a:t>Collect data</a:t>
-                </a:r>
-              </a:p>
-              <a:p>
-                <a:pPr lvl="1"/>
-                <a:r>
-                  <a:rPr lang="en-US" dirty="0"/>
-                  <a:t>input/output pairs</a:t>
-                </a:r>
-              </a:p>
-              <a:p>
-                <a:r>
-                  <a:rPr lang="en-US" dirty="0"/>
-                  <a:t>Analyze data</a:t>
-                </a:r>
-              </a:p>
-              <a:p>
-                <a:pPr lvl="1"/>
-                <a:r>
-                  <a:rPr lang="en-US" dirty="0"/>
-                  <a:t>Is the relationship linear or nonlinear?</a:t>
-                </a:r>
-              </a:p>
-              <a:p>
-                <a:pPr lvl="1"/>
-                <a:r>
-                  <a:rPr lang="en-US" dirty="0"/>
-                  <a:t>More difficult to analyze when </a:t>
-                </a:r>
-                <a14:m>
-                  <m:oMath xmlns:m="http://schemas.openxmlformats.org/officeDocument/2006/math">
-                    <m:r>
-                      <a:rPr lang="en-US" b="0" i="1" smtClean="0">
-                        <a:latin typeface="Cambria Math" panose="02040503050406030204" pitchFamily="18" charset="0"/>
-                      </a:rPr>
-                      <m:t>𝑋</m:t>
-                    </m:r>
-                  </m:oMath>
-                </a14:m>
-                <a:r>
-                  <a:rPr lang="en-US" dirty="0"/>
-                  <a:t> is large,</a:t>
-                </a:r>
-              </a:p>
-              <a:p>
-                <a:pPr marL="457200" lvl="1" indent="0">
-                  <a:buNone/>
-                </a:pPr>
-                <a:r>
-                  <a:rPr lang="en-US" dirty="0"/>
-                  <a:t>   e.g. a tensor</a:t>
-                </a:r>
-              </a:p>
-              <a:p>
-                <a:r>
-                  <a:rPr lang="en-US" dirty="0"/>
-                  <a:t>Choose model for the task</a:t>
-                </a:r>
-              </a:p>
-              <a:p>
-                <a:pPr lvl="1"/>
-                <a:r>
-                  <a:rPr lang="en-US" dirty="0"/>
-                  <a:t>Linear, nonlinear</a:t>
-                </a:r>
-              </a:p>
-            </p:txBody>
-          </p:sp>
-        </mc:Choice>
-        <mc:Fallback xmlns="">
-          <p:sp>
-            <p:nvSpPr>
-              <p:cNvPr id="3" name="Content Placeholder 2">
-                <a:extLst>
-                  <a:ext uri="{FF2B5EF4-FFF2-40B4-BE49-F238E27FC236}">
-                    <a16:creationId xmlns:a16="http://schemas.microsoft.com/office/drawing/2014/main" id="{1B35E2AB-06CC-4EE3-B251-4A320B1EA697}"/>
-                  </a:ext>
-                </a:extLst>
-              </p:cNvPr>
-              <p:cNvSpPr>
-                <a:spLocks noGrp="1" noRot="1" noChangeAspect="1" noMove="1" noResize="1" noEditPoints="1" noAdjustHandles="1" noChangeArrowheads="1" noChangeShapeType="1" noTextEdit="1"/>
-              </p:cNvSpPr>
-              <p:nvPr>
-                <p:ph idx="1"/>
-              </p:nvPr>
-            </p:nvSpPr>
-            <p:spPr>
-              <a:xfrm>
-                <a:off x="838200" y="1825625"/>
-                <a:ext cx="10515600" cy="4351338"/>
-              </a:xfrm>
-              <a:blipFill>
-                <a:blip r:embed="rId2"/>
-                <a:stretch>
-                  <a:fillRect l="-1043" t="-2241"/>
-                </a:stretch>
-              </a:blipFill>
-            </p:spPr>
-            <p:txBody>
-              <a:bodyPr/>
-              <a:lstStyle/>
-              <a:p>
-                <a:r>
-                  <a:rPr lang="en-US">
-                    <a:noFill/>
-                  </a:rPr>
-                  <a:t> </a:t>
-                </a:r>
-              </a:p>
-            </p:txBody>
-          </p:sp>
-        </mc:Fallback>
-      </mc:AlternateContent>
-      <p:pic>
-        <p:nvPicPr>
-          <p:cNvPr id="4098" name="Picture 2" descr="Image result for nonlinear classifier">
-            <a:extLst>
-              <a:ext uri="{FF2B5EF4-FFF2-40B4-BE49-F238E27FC236}">
-                <a16:creationId xmlns:a16="http://schemas.microsoft.com/office/drawing/2014/main" id="{1F8BD860-9D80-47BC-9947-2EC33B1DC707}"/>
-              </a:ext>
-            </a:extLst>
-          </p:cNvPr>
-          <p:cNvPicPr>
-            <a:picLocks noChangeAspect="1" noChangeArrowheads="1"/>
-          </p:cNvPicPr>
-          <p:nvPr/>
-        </p:nvPicPr>
-        <p:blipFill>
-          <a:blip r:embed="rId3">
-            <a:extLst>
-              <a:ext uri="{28A0092B-C50C-407E-A947-70E740481C1C}">
-                <a14:useLocalDpi xmlns:a14="http://schemas.microsoft.com/office/drawing/2010/main" val="0"/>
-              </a:ext>
-            </a:extLst>
-          </a:blip>
-          <a:srcRect/>
-          <a:stretch>
-            <a:fillRect/>
-          </a:stretch>
-        </p:blipFill>
-        <p:spPr bwMode="auto">
-          <a:xfrm>
-            <a:off x="7237093" y="1825625"/>
-            <a:ext cx="4509314" cy="3375957"/>
-          </a:xfrm>
-          <a:prstGeom prst="rect">
-            <a:avLst/>
-          </a:prstGeom>
-          <a:noFill/>
-          <a:extLst>
-            <a:ext uri="{909E8E84-426E-40DD-AFC4-6F175D3DCCD1}">
-              <a14:hiddenFill xmlns:a14="http://schemas.microsoft.com/office/drawing/2010/main">
-                <a:solidFill>
-                  <a:srgbClr val="FFFFFF"/>
-                </a:solidFill>
-              </a14:hiddenFill>
-            </a:ext>
-          </a:extLst>
-        </p:spPr>
-      </p:pic>
+              <a:t>Error metrics</a:t>
+            </a:r>
+          </a:p>
+        </p:txBody>
+      </p:sp>
+      <p:sp>
+        <p:nvSpPr>
+          <p:cNvPr id="5" name="Text Placeholder 4">
+            <a:extLst>
+              <a:ext uri="{FF2B5EF4-FFF2-40B4-BE49-F238E27FC236}">
+                <a16:creationId xmlns:a16="http://schemas.microsoft.com/office/drawing/2014/main" id="{C7081008-227B-4E1C-A44E-E487848AA1D6}"/>
+              </a:ext>
+            </a:extLst>
+          </p:cNvPr>
+          <p:cNvSpPr>
+            <a:spLocks noGrp="1"/>
+          </p:cNvSpPr>
+          <p:nvPr>
+            <p:ph type="body" idx="1"/>
+          </p:nvPr>
+        </p:nvSpPr>
+        <p:spPr/>
+        <p:txBody>
+          <a:bodyPr/>
+          <a:lstStyle/>
+          <a:p>
+            <a:r>
+              <a:rPr lang="en-US" dirty="0"/>
+              <a:t>How to evaluate the performance of your model</a:t>
+            </a:r>
+          </a:p>
+        </p:txBody>
+      </p:sp>
     </p:spTree>
     <p:extLst>
       <p:ext uri="{BB962C8B-B14F-4D97-AF65-F5344CB8AC3E}">
-        <p14:creationId xmlns:p14="http://schemas.microsoft.com/office/powerpoint/2010/main" val="2850802671"/>
+        <p14:creationId xmlns:p14="http://schemas.microsoft.com/office/powerpoint/2010/main" val="606291522"/>
       </p:ext>
     </p:extLst>
   </p:cSld>

</xml_diff>